<commit_message>
adding Instance and Resource Extraction subsection
</commit_message>
<xml_diff>
--- a/Papers/An Extensible Framework to Validate and Build Dataset Profiles/figures/architecutre_diagram.pptx
+++ b/Papers/An Extensible Framework to Validate and Build Dataset Profiles/figures/architecutre_diagram.pptx
@@ -288,7 +288,7 @@
           <a:p>
             <a:fld id="{544FCF9B-4D64-E146-AC3C-205DEAA733C4}" type="datetimeFigureOut">
               <a:rPr lang="en-US" smtClean="0"/>
-              <a:t>09/12/14</a:t>
+              <a:t>12/12/14</a:t>
             </a:fld>
             <a:endParaRPr lang="en-US"/>
           </a:p>
@@ -458,7 +458,7 @@
           <a:p>
             <a:fld id="{544FCF9B-4D64-E146-AC3C-205DEAA733C4}" type="datetimeFigureOut">
               <a:rPr lang="en-US" smtClean="0"/>
-              <a:t>09/12/14</a:t>
+              <a:t>12/12/14</a:t>
             </a:fld>
             <a:endParaRPr lang="en-US"/>
           </a:p>
@@ -638,7 +638,7 @@
           <a:p>
             <a:fld id="{544FCF9B-4D64-E146-AC3C-205DEAA733C4}" type="datetimeFigureOut">
               <a:rPr lang="en-US" smtClean="0"/>
-              <a:t>09/12/14</a:t>
+              <a:t>12/12/14</a:t>
             </a:fld>
             <a:endParaRPr lang="en-US"/>
           </a:p>
@@ -808,7 +808,7 @@
           <a:p>
             <a:fld id="{544FCF9B-4D64-E146-AC3C-205DEAA733C4}" type="datetimeFigureOut">
               <a:rPr lang="en-US" smtClean="0"/>
-              <a:t>09/12/14</a:t>
+              <a:t>12/12/14</a:t>
             </a:fld>
             <a:endParaRPr lang="en-US"/>
           </a:p>
@@ -1054,7 +1054,7 @@
           <a:p>
             <a:fld id="{544FCF9B-4D64-E146-AC3C-205DEAA733C4}" type="datetimeFigureOut">
               <a:rPr lang="en-US" smtClean="0"/>
-              <a:t>09/12/14</a:t>
+              <a:t>12/12/14</a:t>
             </a:fld>
             <a:endParaRPr lang="en-US"/>
           </a:p>
@@ -1342,7 +1342,7 @@
           <a:p>
             <a:fld id="{544FCF9B-4D64-E146-AC3C-205DEAA733C4}" type="datetimeFigureOut">
               <a:rPr lang="en-US" smtClean="0"/>
-              <a:t>09/12/14</a:t>
+              <a:t>12/12/14</a:t>
             </a:fld>
             <a:endParaRPr lang="en-US"/>
           </a:p>
@@ -1764,7 +1764,7 @@
           <a:p>
             <a:fld id="{544FCF9B-4D64-E146-AC3C-205DEAA733C4}" type="datetimeFigureOut">
               <a:rPr lang="en-US" smtClean="0"/>
-              <a:t>09/12/14</a:t>
+              <a:t>12/12/14</a:t>
             </a:fld>
             <a:endParaRPr lang="en-US"/>
           </a:p>
@@ -1882,7 +1882,7 @@
           <a:p>
             <a:fld id="{544FCF9B-4D64-E146-AC3C-205DEAA733C4}" type="datetimeFigureOut">
               <a:rPr lang="en-US" smtClean="0"/>
-              <a:t>09/12/14</a:t>
+              <a:t>12/12/14</a:t>
             </a:fld>
             <a:endParaRPr lang="en-US"/>
           </a:p>
@@ -1977,7 +1977,7 @@
           <a:p>
             <a:fld id="{544FCF9B-4D64-E146-AC3C-205DEAA733C4}" type="datetimeFigureOut">
               <a:rPr lang="en-US" smtClean="0"/>
-              <a:t>09/12/14</a:t>
+              <a:t>12/12/14</a:t>
             </a:fld>
             <a:endParaRPr lang="en-US"/>
           </a:p>
@@ -2254,7 +2254,7 @@
           <a:p>
             <a:fld id="{544FCF9B-4D64-E146-AC3C-205DEAA733C4}" type="datetimeFigureOut">
               <a:rPr lang="en-US" smtClean="0"/>
-              <a:t>09/12/14</a:t>
+              <a:t>12/12/14</a:t>
             </a:fld>
             <a:endParaRPr lang="en-US"/>
           </a:p>
@@ -2507,7 +2507,7 @@
           <a:p>
             <a:fld id="{544FCF9B-4D64-E146-AC3C-205DEAA733C4}" type="datetimeFigureOut">
               <a:rPr lang="en-US" smtClean="0"/>
-              <a:t>09/12/14</a:t>
+              <a:t>12/12/14</a:t>
             </a:fld>
             <a:endParaRPr lang="en-US"/>
           </a:p>
@@ -2720,7 +2720,7 @@
           <a:p>
             <a:fld id="{544FCF9B-4D64-E146-AC3C-205DEAA733C4}" type="datetimeFigureOut">
               <a:rPr lang="en-US" smtClean="0"/>
-              <a:t>09/12/14</a:t>
+              <a:t>12/12/14</a:t>
             </a:fld>
             <a:endParaRPr lang="en-US"/>
           </a:p>
@@ -3095,185 +3095,6 @@
           <a:chExt cx="0" cy="0"/>
         </a:xfrm>
       </p:grpSpPr>
-      <p:sp>
-        <p:nvSpPr>
-          <p:cNvPr id="66" name="TextBox 65"/>
-          <p:cNvSpPr txBox="1"/>
-          <p:nvPr/>
-        </p:nvSpPr>
-        <p:spPr>
-          <a:xfrm>
-            <a:off x="1247066" y="3720485"/>
-            <a:ext cx="4290319" cy="1477328"/>
-          </a:xfrm>
-          <a:prstGeom prst="rect">
-            <a:avLst/>
-          </a:prstGeom>
-          <a:solidFill>
-            <a:schemeClr val="bg1"/>
-          </a:solidFill>
-          <a:ln>
-            <a:solidFill>
-              <a:schemeClr val="tx1"/>
-            </a:solidFill>
-          </a:ln>
-        </p:spPr>
-        <p:txBody>
-          <a:bodyPr wrap="square" rtlCol="0">
-            <a:spAutoFit/>
-          </a:bodyPr>
-          <a:lstStyle/>
-          <a:p>
-            <a:pPr algn="ctr"/>
-            <a:r>
-              <a:rPr lang="en-US" sz="1000" dirty="0" smtClean="0"/>
-              <a:t>Profile Validator and Generator</a:t>
-            </a:r>
-          </a:p>
-          <a:p>
-            <a:pPr algn="ctr"/>
-            <a:endParaRPr lang="en-US" sz="1000" dirty="0"/>
-          </a:p>
-          <a:p>
-            <a:pPr algn="ctr"/>
-            <a:endParaRPr lang="en-US" sz="1000" dirty="0" smtClean="0"/>
-          </a:p>
-          <a:p>
-            <a:pPr algn="ctr"/>
-            <a:endParaRPr lang="en-US" sz="1000" dirty="0"/>
-          </a:p>
-          <a:p>
-            <a:pPr algn="ctr"/>
-            <a:endParaRPr lang="en-US" sz="1000" dirty="0" smtClean="0"/>
-          </a:p>
-          <a:p>
-            <a:pPr algn="ctr"/>
-            <a:endParaRPr lang="en-US" sz="1000" dirty="0"/>
-          </a:p>
-          <a:p>
-            <a:pPr algn="ctr"/>
-            <a:endParaRPr lang="en-US" sz="1000" dirty="0" smtClean="0"/>
-          </a:p>
-          <a:p>
-            <a:pPr algn="ctr"/>
-            <a:endParaRPr lang="en-US" sz="1000" dirty="0"/>
-          </a:p>
-          <a:p>
-            <a:pPr algn="ctr"/>
-            <a:endParaRPr lang="en-US" sz="1000" dirty="0"/>
-          </a:p>
-        </p:txBody>
-      </p:sp>
-      <p:sp>
-        <p:nvSpPr>
-          <p:cNvPr id="14" name="TextBox 13"/>
-          <p:cNvSpPr txBox="1"/>
-          <p:nvPr/>
-        </p:nvSpPr>
-        <p:spPr>
-          <a:xfrm>
-            <a:off x="2902713" y="3977564"/>
-            <a:ext cx="1165025" cy="430887"/>
-          </a:xfrm>
-          <a:prstGeom prst="rect">
-            <a:avLst/>
-          </a:prstGeom>
-          <a:solidFill>
-            <a:schemeClr val="tx1"/>
-          </a:solidFill>
-          <a:ln>
-            <a:solidFill>
-              <a:schemeClr val="tx1"/>
-            </a:solidFill>
-          </a:ln>
-        </p:spPr>
-        <p:txBody>
-          <a:bodyPr wrap="square" rtlCol="0">
-            <a:spAutoFit/>
-          </a:bodyPr>
-          <a:lstStyle/>
-          <a:p>
-            <a:pPr algn="ctr"/>
-            <a:r>
-              <a:rPr lang="en-US" sz="1100" dirty="0" smtClean="0">
-                <a:solidFill>
-                  <a:schemeClr val="bg1"/>
-                </a:solidFill>
-              </a:rPr>
-              <a:t>Statistical Profiler</a:t>
-            </a:r>
-            <a:endParaRPr lang="en-US" sz="1100" dirty="0">
-              <a:solidFill>
-                <a:schemeClr val="bg1"/>
-              </a:solidFill>
-            </a:endParaRPr>
-          </a:p>
-        </p:txBody>
-      </p:sp>
-      <p:cxnSp>
-        <p:nvCxnSpPr>
-          <p:cNvPr id="38" name="Straight Arrow Connector 37"/>
-          <p:cNvCxnSpPr/>
-          <p:nvPr/>
-        </p:nvCxnSpPr>
-        <p:spPr>
-          <a:xfrm>
-            <a:off x="1070708" y="1868730"/>
-            <a:ext cx="0" cy="228600"/>
-          </a:xfrm>
-          <a:prstGeom prst="straightConnector1">
-            <a:avLst/>
-          </a:prstGeom>
-          <a:ln>
-            <a:headEnd type="none"/>
-            <a:tailEnd type="triangle"/>
-          </a:ln>
-        </p:spPr>
-        <p:style>
-          <a:lnRef idx="1">
-            <a:schemeClr val="dk1"/>
-          </a:lnRef>
-          <a:fillRef idx="0">
-            <a:schemeClr val="dk1"/>
-          </a:fillRef>
-          <a:effectRef idx="0">
-            <a:schemeClr val="dk1"/>
-          </a:effectRef>
-          <a:fontRef idx="minor">
-            <a:schemeClr val="tx1"/>
-          </a:fontRef>
-        </p:style>
-      </p:cxnSp>
-      <p:cxnSp>
-        <p:nvCxnSpPr>
-          <p:cNvPr id="41" name="Straight Connector 40"/>
-          <p:cNvCxnSpPr/>
-          <p:nvPr/>
-        </p:nvCxnSpPr>
-        <p:spPr>
-          <a:xfrm>
-            <a:off x="1243306" y="1539855"/>
-            <a:ext cx="4290319" cy="0"/>
-          </a:xfrm>
-          <a:prstGeom prst="line">
-            <a:avLst/>
-          </a:prstGeom>
-        </p:spPr>
-        <p:style>
-          <a:lnRef idx="1">
-            <a:schemeClr val="dk1"/>
-          </a:lnRef>
-          <a:fillRef idx="0">
-            <a:schemeClr val="dk1"/>
-          </a:fillRef>
-          <a:effectRef idx="0">
-            <a:schemeClr val="dk1"/>
-          </a:effectRef>
-          <a:fontRef idx="minor">
-            <a:schemeClr val="tx1"/>
-          </a:fontRef>
-        </p:style>
-      </p:cxnSp>
       <p:grpSp>
         <p:nvGrpSpPr>
           <p:cNvPr id="59" name="Group 58"/>
@@ -3507,128 +3328,605 @@
           </p:txBody>
         </p:sp>
       </p:grpSp>
-      <p:sp>
-        <p:nvSpPr>
-          <p:cNvPr id="50" name="TextBox 49"/>
-          <p:cNvSpPr txBox="1"/>
-          <p:nvPr/>
-        </p:nvSpPr>
-        <p:spPr>
-          <a:xfrm>
-            <a:off x="1243305" y="2019845"/>
-            <a:ext cx="4290319" cy="246221"/>
-          </a:xfrm>
-          <a:prstGeom prst="rect">
-            <a:avLst/>
-          </a:prstGeom>
-          <a:solidFill>
-            <a:schemeClr val="bg1"/>
-          </a:solidFill>
-          <a:ln>
-            <a:solidFill>
-              <a:schemeClr val="tx1"/>
-            </a:solidFill>
-          </a:ln>
-        </p:spPr>
-        <p:txBody>
-          <a:bodyPr wrap="square" rtlCol="0">
-            <a:spAutoFit/>
-          </a:bodyPr>
-          <a:lstStyle/>
-          <a:p>
-            <a:pPr algn="ctr"/>
-            <a:r>
-              <a:rPr lang="en-US" sz="1000" dirty="0" smtClean="0"/>
-              <a:t>Metadata Extractor</a:t>
-            </a:r>
-            <a:endParaRPr lang="en-US" sz="1000" dirty="0"/>
-          </a:p>
-        </p:txBody>
-      </p:sp>
-      <p:sp>
-        <p:nvSpPr>
-          <p:cNvPr id="51" name="TextBox 50"/>
-          <p:cNvSpPr txBox="1"/>
-          <p:nvPr/>
-        </p:nvSpPr>
-        <p:spPr>
-          <a:xfrm>
-            <a:off x="5562600" y="1612920"/>
-            <a:ext cx="348623" cy="276999"/>
-          </a:xfrm>
-          <a:prstGeom prst="rect">
-            <a:avLst/>
-          </a:prstGeom>
-          <a:noFill/>
-        </p:spPr>
-        <p:txBody>
-          <a:bodyPr wrap="none" rtlCol="0">
-            <a:spAutoFit/>
-          </a:bodyPr>
-          <a:lstStyle/>
-          <a:p>
-            <a:r>
-              <a:rPr lang="en-US" sz="1200" dirty="0" smtClean="0"/>
-              <a:t>(ii)</a:t>
-            </a:r>
-            <a:endParaRPr lang="en-US" sz="1200" dirty="0"/>
-          </a:p>
-        </p:txBody>
-      </p:sp>
-      <p:sp>
-        <p:nvSpPr>
-          <p:cNvPr id="54" name="TextBox 53"/>
-          <p:cNvSpPr txBox="1"/>
-          <p:nvPr/>
-        </p:nvSpPr>
-        <p:spPr>
-          <a:xfrm>
-            <a:off x="5555617" y="1983030"/>
-            <a:ext cx="383939" cy="276999"/>
-          </a:xfrm>
-          <a:prstGeom prst="rect">
-            <a:avLst/>
-          </a:prstGeom>
-          <a:noFill/>
-        </p:spPr>
-        <p:txBody>
-          <a:bodyPr wrap="none" rtlCol="0">
-            <a:spAutoFit/>
-          </a:bodyPr>
-          <a:lstStyle/>
-          <a:p>
-            <a:r>
-              <a:rPr lang="en-US" sz="1200" dirty="0" smtClean="0"/>
-              <a:t>(iii)</a:t>
-            </a:r>
-            <a:endParaRPr lang="en-US" sz="1200" dirty="0"/>
-          </a:p>
-        </p:txBody>
-      </p:sp>
       <p:grpSp>
         <p:nvGrpSpPr>
-          <p:cNvPr id="68" name="Group 67"/>
+          <p:cNvPr id="4" name="Group 3"/>
           <p:cNvGrpSpPr/>
           <p:nvPr/>
         </p:nvGrpSpPr>
         <p:grpSpPr>
           <a:xfrm>
-            <a:off x="1243306" y="2378887"/>
-            <a:ext cx="4290319" cy="1228899"/>
-            <a:chOff x="1243306" y="2692120"/>
-            <a:chExt cx="4290319" cy="1228899"/>
+            <a:off x="1233443" y="1608161"/>
+            <a:ext cx="4696250" cy="1303414"/>
+            <a:chOff x="1243306" y="2304372"/>
+            <a:chExt cx="4696250" cy="1303414"/>
           </a:xfrm>
         </p:grpSpPr>
         <p:sp>
           <p:nvSpPr>
-            <p:cNvPr id="52" name="TextBox 51"/>
+            <p:cNvPr id="54" name="TextBox 53"/>
             <p:cNvSpPr txBox="1"/>
             <p:nvPr/>
           </p:nvSpPr>
           <p:spPr>
             <a:xfrm>
-              <a:off x="1243306" y="2692120"/>
-              <a:ext cx="4290319" cy="1169551"/>
+              <a:off x="5555617" y="2304372"/>
+              <a:ext cx="383939" cy="276999"/>
+            </a:xfrm>
+            <a:prstGeom prst="rect">
+              <a:avLst/>
+            </a:prstGeom>
+            <a:noFill/>
+          </p:spPr>
+          <p:txBody>
+            <a:bodyPr wrap="none" rtlCol="0">
+              <a:spAutoFit/>
+            </a:bodyPr>
+            <a:lstStyle/>
+            <a:p>
+              <a:r>
+                <a:rPr lang="en-US" sz="1200" dirty="0" smtClean="0"/>
+                <a:t>(iii)</a:t>
+              </a:r>
+              <a:endParaRPr lang="en-US" sz="1200" dirty="0"/>
+            </a:p>
+          </p:txBody>
+        </p:sp>
+        <p:grpSp>
+          <p:nvGrpSpPr>
+            <p:cNvPr id="68" name="Group 67"/>
+            <p:cNvGrpSpPr/>
+            <p:nvPr/>
+          </p:nvGrpSpPr>
+          <p:grpSpPr>
+            <a:xfrm>
+              <a:off x="1243306" y="2378887"/>
+              <a:ext cx="4290319" cy="1228899"/>
+              <a:chOff x="1243306" y="2692120"/>
+              <a:chExt cx="4290319" cy="1228899"/>
+            </a:xfrm>
+          </p:grpSpPr>
+          <p:sp>
+            <p:nvSpPr>
+              <p:cNvPr id="52" name="TextBox 51"/>
+              <p:cNvSpPr txBox="1"/>
+              <p:nvPr/>
+            </p:nvSpPr>
+            <p:spPr>
+              <a:xfrm>
+                <a:off x="1243306" y="2692120"/>
+                <a:ext cx="4290319" cy="1169551"/>
+              </a:xfrm>
+              <a:prstGeom prst="rect">
+                <a:avLst/>
+              </a:prstGeom>
+              <a:solidFill>
+                <a:schemeClr val="bg1"/>
+              </a:solidFill>
+              <a:ln>
+                <a:solidFill>
+                  <a:schemeClr val="tx1"/>
+                </a:solidFill>
+              </a:ln>
+            </p:spPr>
+            <p:txBody>
+              <a:bodyPr wrap="square" rtlCol="0">
+                <a:spAutoFit/>
+              </a:bodyPr>
+              <a:lstStyle/>
+              <a:p>
+                <a:pPr algn="ctr"/>
+                <a:r>
+                  <a:rPr lang="en-US" sz="1000" dirty="0" smtClean="0"/>
+                  <a:t>Instance and Resource Extraction</a:t>
+                </a:r>
+              </a:p>
+              <a:p>
+                <a:pPr algn="ctr"/>
+                <a:endParaRPr lang="en-US" sz="1000" dirty="0"/>
+              </a:p>
+              <a:p>
+                <a:pPr algn="ctr"/>
+                <a:endParaRPr lang="en-US" sz="1000" dirty="0" smtClean="0"/>
+              </a:p>
+              <a:p>
+                <a:pPr algn="ctr"/>
+                <a:endParaRPr lang="en-US" sz="1000" dirty="0"/>
+              </a:p>
+              <a:p>
+                <a:pPr algn="ctr"/>
+                <a:endParaRPr lang="en-US" sz="1000" dirty="0" smtClean="0"/>
+              </a:p>
+              <a:p>
+                <a:pPr algn="ctr"/>
+                <a:endParaRPr lang="en-US" sz="1000" dirty="0" smtClean="0"/>
+              </a:p>
+              <a:p>
+                <a:pPr algn="ctr"/>
+                <a:endParaRPr lang="en-US" sz="1000" dirty="0"/>
+              </a:p>
+            </p:txBody>
+          </p:sp>
+          <p:grpSp>
+            <p:nvGrpSpPr>
+              <p:cNvPr id="61" name="Group 60"/>
+              <p:cNvGrpSpPr/>
+              <p:nvPr/>
+            </p:nvGrpSpPr>
+            <p:grpSpPr>
+              <a:xfrm>
+                <a:off x="1379234" y="2980508"/>
+                <a:ext cx="1475242" cy="926709"/>
+                <a:chOff x="1379234" y="2714418"/>
+                <a:chExt cx="1475242" cy="926709"/>
+              </a:xfrm>
+            </p:grpSpPr>
+            <p:grpSp>
+              <p:nvGrpSpPr>
+                <p:cNvPr id="60" name="Group 59"/>
+                <p:cNvGrpSpPr/>
+                <p:nvPr/>
+              </p:nvGrpSpPr>
+              <p:grpSpPr>
+                <a:xfrm>
+                  <a:off x="1379234" y="2714418"/>
+                  <a:ext cx="1475242" cy="696884"/>
+                  <a:chOff x="4996774" y="307464"/>
+                  <a:chExt cx="1437893" cy="828222"/>
+                </a:xfrm>
+              </p:grpSpPr>
+              <p:sp>
+                <p:nvSpPr>
+                  <p:cNvPr id="39" name="TextBox 38"/>
+                  <p:cNvSpPr txBox="1"/>
+                  <p:nvPr/>
+                </p:nvSpPr>
+                <p:spPr>
+                  <a:xfrm>
+                    <a:off x="4996774" y="307464"/>
+                    <a:ext cx="1437893" cy="292625"/>
+                  </a:xfrm>
+                  <a:prstGeom prst="rect">
+                    <a:avLst/>
+                  </a:prstGeom>
+                  <a:solidFill>
+                    <a:schemeClr val="tx1"/>
+                  </a:solidFill>
+                  <a:ln>
+                    <a:solidFill>
+                      <a:schemeClr val="tx1"/>
+                    </a:solidFill>
+                  </a:ln>
+                </p:spPr>
+                <p:txBody>
+                  <a:bodyPr wrap="square" rtlCol="0">
+                    <a:spAutoFit/>
+                  </a:bodyPr>
+                  <a:lstStyle/>
+                  <a:p>
+                    <a:pPr algn="ctr"/>
+                    <a:r>
+                      <a:rPr lang="en-US" sz="1000" dirty="0" smtClean="0">
+                        <a:solidFill>
+                          <a:schemeClr val="bg1"/>
+                        </a:solidFill>
+                      </a:rPr>
+                      <a:t>Sampler</a:t>
+                    </a:r>
+                    <a:endParaRPr lang="en-US" sz="1000" dirty="0">
+                      <a:solidFill>
+                        <a:schemeClr val="bg1"/>
+                      </a:solidFill>
+                    </a:endParaRPr>
+                  </a:p>
+                </p:txBody>
+              </p:sp>
+              <p:sp>
+                <p:nvSpPr>
+                  <p:cNvPr id="55" name="TextBox 54"/>
+                  <p:cNvSpPr txBox="1"/>
+                  <p:nvPr/>
+                </p:nvSpPr>
+                <p:spPr>
+                  <a:xfrm>
+                    <a:off x="5226579" y="652364"/>
+                    <a:ext cx="907320" cy="200055"/>
+                  </a:xfrm>
+                  <a:prstGeom prst="rect">
+                    <a:avLst/>
+                  </a:prstGeom>
+                  <a:solidFill>
+                    <a:srgbClr val="FFC000">
+                      <a:alpha val="21961"/>
+                    </a:srgbClr>
+                  </a:solidFill>
+                  <a:ln>
+                    <a:solidFill>
+                      <a:schemeClr val="tx1"/>
+                    </a:solidFill>
+                  </a:ln>
+                </p:spPr>
+                <p:txBody>
+                  <a:bodyPr wrap="square" rtlCol="0">
+                    <a:spAutoFit/>
+                  </a:bodyPr>
+                  <a:lstStyle/>
+                  <a:p>
+                    <a:pPr algn="ctr"/>
+                    <a:r>
+                      <a:rPr lang="en-US" sz="700" dirty="0" smtClean="0"/>
+                      <a:t>Random Sampling</a:t>
+                    </a:r>
+                    <a:endParaRPr lang="en-US" sz="700" dirty="0"/>
+                  </a:p>
+                </p:txBody>
+              </p:sp>
+              <p:sp>
+                <p:nvSpPr>
+                  <p:cNvPr id="56" name="TextBox 55"/>
+                  <p:cNvSpPr txBox="1"/>
+                  <p:nvPr/>
+                </p:nvSpPr>
+                <p:spPr>
+                  <a:xfrm>
+                    <a:off x="5226579" y="935631"/>
+                    <a:ext cx="907320" cy="200055"/>
+                  </a:xfrm>
+                  <a:prstGeom prst="rect">
+                    <a:avLst/>
+                  </a:prstGeom>
+                  <a:solidFill>
+                    <a:srgbClr val="FFC000">
+                      <a:alpha val="21961"/>
+                    </a:srgbClr>
+                  </a:solidFill>
+                  <a:ln>
+                    <a:solidFill>
+                      <a:schemeClr val="tx1"/>
+                    </a:solidFill>
+                  </a:ln>
+                </p:spPr>
+                <p:txBody>
+                  <a:bodyPr wrap="square" rtlCol="0">
+                    <a:spAutoFit/>
+                  </a:bodyPr>
+                  <a:lstStyle/>
+                  <a:p>
+                    <a:pPr algn="ctr"/>
+                    <a:r>
+                      <a:rPr lang="en-US" sz="700" dirty="0" smtClean="0"/>
+                      <a:t>Weighted Sampling</a:t>
+                    </a:r>
+                    <a:endParaRPr lang="en-US" sz="700" dirty="0"/>
+                  </a:p>
+                </p:txBody>
+              </p:sp>
+            </p:grpSp>
+            <p:sp>
+              <p:nvSpPr>
+                <p:cNvPr id="58" name="TextBox 57"/>
+                <p:cNvSpPr txBox="1"/>
+                <p:nvPr/>
+              </p:nvSpPr>
+              <p:spPr>
+                <a:xfrm>
+                  <a:off x="1867816" y="3271795"/>
+                  <a:ext cx="344039" cy="369332"/>
+                </a:xfrm>
+                <a:prstGeom prst="rect">
+                  <a:avLst/>
+                </a:prstGeom>
+                <a:noFill/>
+              </p:spPr>
+              <p:txBody>
+                <a:bodyPr wrap="none" rtlCol="0">
+                  <a:spAutoFit/>
+                </a:bodyPr>
+                <a:lstStyle/>
+                <a:p>
+                  <a:r>
+                    <a:rPr lang="en-US" dirty="0" smtClean="0"/>
+                    <a:t>…</a:t>
+                  </a:r>
+                  <a:endParaRPr lang="en-US" dirty="0"/>
+                </a:p>
+              </p:txBody>
+            </p:sp>
+          </p:grpSp>
+          <p:sp>
+            <p:nvSpPr>
+              <p:cNvPr id="62" name="TextBox 61"/>
+              <p:cNvSpPr txBox="1"/>
+              <p:nvPr/>
+            </p:nvSpPr>
+            <p:spPr>
+              <a:xfrm>
+                <a:off x="3702554" y="2985607"/>
+                <a:ext cx="1475242" cy="246221"/>
+              </a:xfrm>
+              <a:prstGeom prst="rect">
+                <a:avLst/>
+              </a:prstGeom>
+              <a:solidFill>
+                <a:schemeClr val="tx1"/>
+              </a:solidFill>
+              <a:ln>
+                <a:solidFill>
+                  <a:schemeClr val="tx1"/>
+                </a:solidFill>
+              </a:ln>
+            </p:spPr>
+            <p:txBody>
+              <a:bodyPr wrap="square" rtlCol="0">
+                <a:spAutoFit/>
+              </a:bodyPr>
+              <a:lstStyle/>
+              <a:p>
+                <a:pPr algn="ctr"/>
+                <a:r>
+                  <a:rPr lang="en-US" sz="1000" dirty="0" smtClean="0">
+                    <a:solidFill>
+                      <a:schemeClr val="bg1"/>
+                    </a:solidFill>
+                  </a:rPr>
+                  <a:t>Validator</a:t>
+                </a:r>
+                <a:endParaRPr lang="en-US" sz="1000" dirty="0">
+                  <a:solidFill>
+                    <a:schemeClr val="bg1"/>
+                  </a:solidFill>
+                </a:endParaRPr>
+              </a:p>
+            </p:txBody>
+          </p:sp>
+          <p:sp>
+            <p:nvSpPr>
+              <p:cNvPr id="63" name="TextBox 62"/>
+              <p:cNvSpPr txBox="1"/>
+              <p:nvPr/>
+            </p:nvSpPr>
+            <p:spPr>
+              <a:xfrm>
+                <a:off x="3950541" y="3269980"/>
+                <a:ext cx="930887" cy="200055"/>
+              </a:xfrm>
+              <a:prstGeom prst="rect">
+                <a:avLst/>
+              </a:prstGeom>
+              <a:solidFill>
+                <a:srgbClr val="FFC000">
+                  <a:alpha val="21961"/>
+                </a:srgbClr>
+              </a:solidFill>
+              <a:ln>
+                <a:solidFill>
+                  <a:schemeClr val="tx1"/>
+                </a:solidFill>
+              </a:ln>
+            </p:spPr>
+            <p:txBody>
+              <a:bodyPr wrap="square" rtlCol="0">
+                <a:spAutoFit/>
+              </a:bodyPr>
+              <a:lstStyle/>
+              <a:p>
+                <a:pPr algn="ctr"/>
+                <a:r>
+                  <a:rPr lang="en-US" sz="700" dirty="0" smtClean="0"/>
+                  <a:t>CSV Validator</a:t>
+                </a:r>
+                <a:endParaRPr lang="en-US" sz="700" dirty="0"/>
+              </a:p>
+            </p:txBody>
+          </p:sp>
+          <p:sp>
+            <p:nvSpPr>
+              <p:cNvPr id="64" name="TextBox 63"/>
+              <p:cNvSpPr txBox="1"/>
+              <p:nvPr/>
+            </p:nvSpPr>
+            <p:spPr>
+              <a:xfrm>
+                <a:off x="3950541" y="3522407"/>
+                <a:ext cx="930887" cy="200055"/>
+              </a:xfrm>
+              <a:prstGeom prst="rect">
+                <a:avLst/>
+              </a:prstGeom>
+              <a:solidFill>
+                <a:srgbClr val="FFC000">
+                  <a:alpha val="21961"/>
+                </a:srgbClr>
+              </a:solidFill>
+              <a:ln>
+                <a:solidFill>
+                  <a:schemeClr val="tx1"/>
+                </a:solidFill>
+              </a:ln>
+            </p:spPr>
+            <p:txBody>
+              <a:bodyPr wrap="square" rtlCol="0">
+                <a:spAutoFit/>
+              </a:bodyPr>
+              <a:lstStyle/>
+              <a:p>
+                <a:pPr algn="ctr"/>
+                <a:r>
+                  <a:rPr lang="en-US" sz="700" dirty="0" smtClean="0"/>
+                  <a:t>RDF Validator</a:t>
+                </a:r>
+                <a:endParaRPr lang="en-US" sz="700" dirty="0"/>
+              </a:p>
+            </p:txBody>
+          </p:sp>
+          <p:sp>
+            <p:nvSpPr>
+              <p:cNvPr id="65" name="TextBox 64"/>
+              <p:cNvSpPr txBox="1"/>
+              <p:nvPr/>
+            </p:nvSpPr>
+            <p:spPr>
+              <a:xfrm>
+                <a:off x="4184789" y="3551687"/>
+                <a:ext cx="344039" cy="369332"/>
+              </a:xfrm>
+              <a:prstGeom prst="rect">
+                <a:avLst/>
+              </a:prstGeom>
+              <a:noFill/>
+            </p:spPr>
+            <p:txBody>
+              <a:bodyPr wrap="none" rtlCol="0">
+                <a:spAutoFit/>
+              </a:bodyPr>
+              <a:lstStyle/>
+              <a:p>
+                <a:r>
+                  <a:rPr lang="en-US" dirty="0" smtClean="0"/>
+                  <a:t>…</a:t>
+                </a:r>
+                <a:endParaRPr lang="en-US" dirty="0"/>
+              </a:p>
+            </p:txBody>
+          </p:sp>
+        </p:grpSp>
+      </p:grpSp>
+      <p:grpSp>
+        <p:nvGrpSpPr>
+          <p:cNvPr id="6" name="Group 5"/>
+          <p:cNvGrpSpPr/>
+          <p:nvPr/>
+        </p:nvGrpSpPr>
+        <p:grpSpPr>
+          <a:xfrm>
+            <a:off x="1233443" y="1288150"/>
+            <a:ext cx="4664157" cy="284513"/>
+            <a:chOff x="1247066" y="1612920"/>
+            <a:chExt cx="4664157" cy="284513"/>
+          </a:xfrm>
+        </p:grpSpPr>
+        <p:sp>
+          <p:nvSpPr>
+            <p:cNvPr id="51" name="TextBox 50"/>
+            <p:cNvSpPr txBox="1"/>
+            <p:nvPr/>
+          </p:nvSpPr>
+          <p:spPr>
+            <a:xfrm>
+              <a:off x="5562600" y="1612920"/>
+              <a:ext cx="348623" cy="276999"/>
+            </a:xfrm>
+            <a:prstGeom prst="rect">
+              <a:avLst/>
+            </a:prstGeom>
+            <a:noFill/>
+          </p:spPr>
+          <p:txBody>
+            <a:bodyPr wrap="none" rtlCol="0">
+              <a:spAutoFit/>
+            </a:bodyPr>
+            <a:lstStyle/>
+            <a:p>
+              <a:r>
+                <a:rPr lang="en-US" sz="1200" dirty="0" smtClean="0"/>
+                <a:t>(ii)</a:t>
+              </a:r>
+              <a:endParaRPr lang="en-US" sz="1200" dirty="0"/>
+            </a:p>
+          </p:txBody>
+        </p:sp>
+        <p:sp>
+          <p:nvSpPr>
+            <p:cNvPr id="67" name="TextBox 66"/>
+            <p:cNvSpPr txBox="1"/>
+            <p:nvPr/>
+          </p:nvSpPr>
+          <p:spPr>
+            <a:xfrm>
+              <a:off x="1247066" y="1651212"/>
+              <a:ext cx="4290319" cy="246221"/>
+            </a:xfrm>
+            <a:prstGeom prst="rect">
+              <a:avLst/>
+            </a:prstGeom>
+            <a:solidFill>
+              <a:schemeClr val="bg1"/>
+            </a:solidFill>
+            <a:ln>
+              <a:solidFill>
+                <a:schemeClr val="tx1"/>
+              </a:solidFill>
+            </a:ln>
+          </p:spPr>
+          <p:txBody>
+            <a:bodyPr wrap="square" rtlCol="0">
+              <a:spAutoFit/>
+            </a:bodyPr>
+            <a:lstStyle/>
+            <a:p>
+              <a:pPr algn="ctr"/>
+              <a:r>
+                <a:rPr lang="en-US" sz="1000" dirty="0"/>
+                <a:t>Metadata Extractor</a:t>
+              </a:r>
+            </a:p>
+          </p:txBody>
+        </p:sp>
+      </p:grpSp>
+      <p:grpSp>
+        <p:nvGrpSpPr>
+          <p:cNvPr id="2" name="Group 1"/>
+          <p:cNvGrpSpPr/>
+          <p:nvPr/>
+        </p:nvGrpSpPr>
+        <p:grpSpPr>
+          <a:xfrm>
+            <a:off x="1247066" y="4491391"/>
+            <a:ext cx="4711478" cy="276999"/>
+            <a:chOff x="1247066" y="5287076"/>
+            <a:chExt cx="4711478" cy="276999"/>
+          </a:xfrm>
+        </p:grpSpPr>
+        <p:sp>
+          <p:nvSpPr>
+            <p:cNvPr id="90" name="TextBox 89"/>
+            <p:cNvSpPr txBox="1"/>
+            <p:nvPr/>
+          </p:nvSpPr>
+          <p:spPr>
+            <a:xfrm>
+              <a:off x="5611048" y="5287076"/>
+              <a:ext cx="347496" cy="276999"/>
+            </a:xfrm>
+            <a:prstGeom prst="rect">
+              <a:avLst/>
+            </a:prstGeom>
+            <a:noFill/>
+          </p:spPr>
+          <p:txBody>
+            <a:bodyPr wrap="none" rtlCol="0">
+              <a:spAutoFit/>
+            </a:bodyPr>
+            <a:lstStyle/>
+            <a:p>
+              <a:r>
+                <a:rPr lang="en-US" sz="1200" dirty="0" smtClean="0"/>
+                <a:t>(v)</a:t>
+              </a:r>
+              <a:endParaRPr lang="en-US" sz="1200" dirty="0"/>
+            </a:p>
+          </p:txBody>
+        </p:sp>
+        <p:sp>
+          <p:nvSpPr>
+            <p:cNvPr id="92" name="TextBox 91"/>
+            <p:cNvSpPr txBox="1"/>
+            <p:nvPr/>
+          </p:nvSpPr>
+          <p:spPr>
+            <a:xfrm>
+              <a:off x="1247066" y="5310029"/>
+              <a:ext cx="4290319" cy="246221"/>
             </a:xfrm>
             <a:prstGeom prst="rect">
               <a:avLst/>
@@ -3651,7 +3949,60 @@
               <a:pPr algn="ctr"/>
               <a:r>
                 <a:rPr lang="en-US" sz="1000" dirty="0" smtClean="0"/>
-                <a:t>Instance and Resource Extraction</a:t>
+                <a:t>Report Generator</a:t>
+              </a:r>
+              <a:endParaRPr lang="en-US" sz="1000" dirty="0"/>
+            </a:p>
+          </p:txBody>
+        </p:sp>
+      </p:grpSp>
+      <p:grpSp>
+        <p:nvGrpSpPr>
+          <p:cNvPr id="3" name="Group 2"/>
+          <p:cNvGrpSpPr/>
+          <p:nvPr/>
+        </p:nvGrpSpPr>
+        <p:grpSpPr>
+          <a:xfrm>
+            <a:off x="1244621" y="2892300"/>
+            <a:ext cx="4698623" cy="1531908"/>
+            <a:chOff x="1247066" y="3665905"/>
+            <a:chExt cx="4698623" cy="1531908"/>
+          </a:xfrm>
+        </p:grpSpPr>
+        <p:sp>
+          <p:nvSpPr>
+            <p:cNvPr id="66" name="TextBox 65"/>
+            <p:cNvSpPr txBox="1"/>
+            <p:nvPr/>
+          </p:nvSpPr>
+          <p:spPr>
+            <a:xfrm>
+              <a:off x="1247066" y="3720485"/>
+              <a:ext cx="4290319" cy="1477328"/>
+            </a:xfrm>
+            <a:prstGeom prst="rect">
+              <a:avLst/>
+            </a:prstGeom>
+            <a:solidFill>
+              <a:schemeClr val="bg1"/>
+            </a:solidFill>
+            <a:ln>
+              <a:solidFill>
+                <a:schemeClr val="tx1"/>
+              </a:solidFill>
+            </a:ln>
+          </p:spPr>
+          <p:txBody>
+            <a:bodyPr wrap="square" rtlCol="0">
+              <a:spAutoFit/>
+            </a:bodyPr>
+            <a:lstStyle/>
+            <a:p>
+              <a:pPr algn="ctr"/>
+              <a:r>
+                <a:rPr lang="en-US" sz="1000" dirty="0" smtClean="0"/>
+                <a:t>Profile Validator and Generator</a:t>
               </a:r>
             </a:p>
             <a:p>
@@ -3672,7 +4023,15 @@
             </a:p>
             <a:p>
               <a:pPr algn="ctr"/>
+              <a:endParaRPr lang="en-US" sz="1000" dirty="0"/>
+            </a:p>
+            <a:p>
+              <a:pPr algn="ctr"/>
               <a:endParaRPr lang="en-US" sz="1000" dirty="0" smtClean="0"/>
+            </a:p>
+            <a:p>
+              <a:pPr algn="ctr"/>
+              <a:endParaRPr lang="en-US" sz="1000" dirty="0"/>
             </a:p>
             <a:p>
               <a:pPr algn="ctr"/>
@@ -3680,202 +4039,16 @@
             </a:p>
           </p:txBody>
         </p:sp>
-        <p:grpSp>
-          <p:nvGrpSpPr>
-            <p:cNvPr id="61" name="Group 60"/>
-            <p:cNvGrpSpPr/>
-            <p:nvPr/>
-          </p:nvGrpSpPr>
-          <p:grpSpPr>
-            <a:xfrm>
-              <a:off x="1379234" y="2980508"/>
-              <a:ext cx="1475242" cy="926709"/>
-              <a:chOff x="1379234" y="2714418"/>
-              <a:chExt cx="1475242" cy="926709"/>
-            </a:xfrm>
-          </p:grpSpPr>
-          <p:grpSp>
-            <p:nvGrpSpPr>
-              <p:cNvPr id="60" name="Group 59"/>
-              <p:cNvGrpSpPr/>
-              <p:nvPr/>
-            </p:nvGrpSpPr>
-            <p:grpSpPr>
-              <a:xfrm>
-                <a:off x="1379234" y="2714418"/>
-                <a:ext cx="1475242" cy="696884"/>
-                <a:chOff x="4996774" y="307464"/>
-                <a:chExt cx="1437893" cy="828222"/>
-              </a:xfrm>
-            </p:grpSpPr>
-            <p:sp>
-              <p:nvSpPr>
-                <p:cNvPr id="39" name="TextBox 38"/>
-                <p:cNvSpPr txBox="1"/>
-                <p:nvPr/>
-              </p:nvSpPr>
-              <p:spPr>
-                <a:xfrm>
-                  <a:off x="4996774" y="307464"/>
-                  <a:ext cx="1437893" cy="292625"/>
-                </a:xfrm>
-                <a:prstGeom prst="rect">
-                  <a:avLst/>
-                </a:prstGeom>
-                <a:solidFill>
-                  <a:schemeClr val="tx1"/>
-                </a:solidFill>
-                <a:ln>
-                  <a:solidFill>
-                    <a:schemeClr val="tx1"/>
-                  </a:solidFill>
-                </a:ln>
-              </p:spPr>
-              <p:txBody>
-                <a:bodyPr wrap="square" rtlCol="0">
-                  <a:spAutoFit/>
-                </a:bodyPr>
-                <a:lstStyle/>
-                <a:p>
-                  <a:pPr algn="ctr"/>
-                  <a:r>
-                    <a:rPr lang="en-US" sz="1000" dirty="0" smtClean="0">
-                      <a:solidFill>
-                        <a:schemeClr val="bg1"/>
-                      </a:solidFill>
-                    </a:rPr>
-                    <a:t>Sampler</a:t>
-                  </a:r>
-                  <a:endParaRPr lang="en-US" sz="1000" dirty="0">
-                    <a:solidFill>
-                      <a:schemeClr val="bg1"/>
-                    </a:solidFill>
-                  </a:endParaRPr>
-                </a:p>
-              </p:txBody>
-            </p:sp>
-            <p:sp>
-              <p:nvSpPr>
-                <p:cNvPr id="55" name="TextBox 54"/>
-                <p:cNvSpPr txBox="1"/>
-                <p:nvPr/>
-              </p:nvSpPr>
-              <p:spPr>
-                <a:xfrm>
-                  <a:off x="5226579" y="652364"/>
-                  <a:ext cx="907320" cy="200055"/>
-                </a:xfrm>
-                <a:prstGeom prst="rect">
-                  <a:avLst/>
-                </a:prstGeom>
-                <a:solidFill>
-                  <a:srgbClr val="FFC000">
-                    <a:alpha val="21961"/>
-                  </a:srgbClr>
-                </a:solidFill>
-                <a:ln>
-                  <a:solidFill>
-                    <a:schemeClr val="tx1"/>
-                  </a:solidFill>
-                </a:ln>
-              </p:spPr>
-              <p:txBody>
-                <a:bodyPr wrap="square" rtlCol="0">
-                  <a:spAutoFit/>
-                </a:bodyPr>
-                <a:lstStyle/>
-                <a:p>
-                  <a:pPr algn="ctr"/>
-                  <a:r>
-                    <a:rPr lang="en-US" sz="700" dirty="0" smtClean="0"/>
-                    <a:t>Random Sampling</a:t>
-                  </a:r>
-                  <a:endParaRPr lang="en-US" sz="700" dirty="0"/>
-                </a:p>
-              </p:txBody>
-            </p:sp>
-            <p:sp>
-              <p:nvSpPr>
-                <p:cNvPr id="56" name="TextBox 55"/>
-                <p:cNvSpPr txBox="1"/>
-                <p:nvPr/>
-              </p:nvSpPr>
-              <p:spPr>
-                <a:xfrm>
-                  <a:off x="5226579" y="935631"/>
-                  <a:ext cx="907320" cy="200055"/>
-                </a:xfrm>
-                <a:prstGeom prst="rect">
-                  <a:avLst/>
-                </a:prstGeom>
-                <a:solidFill>
-                  <a:srgbClr val="FFC000">
-                    <a:alpha val="21961"/>
-                  </a:srgbClr>
-                </a:solidFill>
-                <a:ln>
-                  <a:solidFill>
-                    <a:schemeClr val="tx1"/>
-                  </a:solidFill>
-                </a:ln>
-              </p:spPr>
-              <p:txBody>
-                <a:bodyPr wrap="square" rtlCol="0">
-                  <a:spAutoFit/>
-                </a:bodyPr>
-                <a:lstStyle/>
-                <a:p>
-                  <a:pPr algn="ctr"/>
-                  <a:r>
-                    <a:rPr lang="en-US" sz="700" dirty="0" smtClean="0"/>
-                    <a:t>Weighted Sampling</a:t>
-                  </a:r>
-                  <a:endParaRPr lang="en-US" sz="700" dirty="0"/>
-                </a:p>
-              </p:txBody>
-            </p:sp>
-          </p:grpSp>
-          <p:sp>
-            <p:nvSpPr>
-              <p:cNvPr id="58" name="TextBox 57"/>
-              <p:cNvSpPr txBox="1"/>
-              <p:nvPr/>
-            </p:nvSpPr>
-            <p:spPr>
-              <a:xfrm>
-                <a:off x="1867816" y="3271795"/>
-                <a:ext cx="344039" cy="369332"/>
-              </a:xfrm>
-              <a:prstGeom prst="rect">
-                <a:avLst/>
-              </a:prstGeom>
-              <a:noFill/>
-            </p:spPr>
-            <p:txBody>
-              <a:bodyPr wrap="none" rtlCol="0">
-                <a:spAutoFit/>
-              </a:bodyPr>
-              <a:lstStyle/>
-              <a:p>
-                <a:r>
-                  <a:rPr lang="en-US" dirty="0" smtClean="0"/>
-                  <a:t>…</a:t>
-                </a:r>
-                <a:endParaRPr lang="en-US" dirty="0"/>
-              </a:p>
-            </p:txBody>
-          </p:sp>
-        </p:grpSp>
         <p:sp>
           <p:nvSpPr>
-            <p:cNvPr id="62" name="TextBox 61"/>
+            <p:cNvPr id="14" name="TextBox 13"/>
             <p:cNvSpPr txBox="1"/>
             <p:nvPr/>
           </p:nvSpPr>
           <p:spPr>
             <a:xfrm>
-              <a:off x="3702554" y="2985607"/>
-              <a:ext cx="1475242" cy="246221"/>
+              <a:off x="2902713" y="3977564"/>
+              <a:ext cx="1165025" cy="430887"/>
             </a:xfrm>
             <a:prstGeom prst="rect">
               <a:avLst/>
@@ -3897,14 +4070,14 @@
             <a:p>
               <a:pPr algn="ctr"/>
               <a:r>
-                <a:rPr lang="en-US" sz="1000" dirty="0" smtClean="0">
+                <a:rPr lang="en-US" sz="1100" dirty="0" smtClean="0">
                   <a:solidFill>
                     <a:schemeClr val="bg1"/>
                   </a:solidFill>
                 </a:rPr>
-                <a:t>Validator</a:t>
+                <a:t>Statistical Profiler</a:t>
               </a:r>
-              <a:endParaRPr lang="en-US" sz="1000" dirty="0">
+              <a:endParaRPr lang="en-US" sz="1100" dirty="0">
                 <a:solidFill>
                   <a:schemeClr val="bg1"/>
                 </a:solidFill>
@@ -3914,22 +4087,294 @@
         </p:sp>
         <p:sp>
           <p:nvSpPr>
-            <p:cNvPr id="63" name="TextBox 62"/>
+            <p:cNvPr id="69" name="TextBox 68"/>
             <p:cNvSpPr txBox="1"/>
             <p:nvPr/>
           </p:nvSpPr>
           <p:spPr>
             <a:xfrm>
-              <a:off x="3950541" y="3269980"/>
-              <a:ext cx="930887" cy="200055"/>
+              <a:off x="5562877" y="3665905"/>
+              <a:ext cx="382812" cy="276999"/>
+            </a:xfrm>
+            <a:prstGeom prst="rect">
+              <a:avLst/>
+            </a:prstGeom>
+            <a:noFill/>
+          </p:spPr>
+          <p:txBody>
+            <a:bodyPr wrap="none" rtlCol="0">
+              <a:spAutoFit/>
+            </a:bodyPr>
+            <a:lstStyle/>
+            <a:p>
+              <a:r>
+                <a:rPr lang="en-US" sz="1200" dirty="0" smtClean="0"/>
+                <a:t>(iv)</a:t>
+              </a:r>
+              <a:endParaRPr lang="en-US" sz="1200" dirty="0"/>
+            </a:p>
+          </p:txBody>
+        </p:sp>
+        <p:grpSp>
+          <p:nvGrpSpPr>
+            <p:cNvPr id="88" name="Group 87"/>
+            <p:cNvGrpSpPr/>
+            <p:nvPr/>
+          </p:nvGrpSpPr>
+          <p:grpSpPr>
+            <a:xfrm>
+              <a:off x="1343826" y="3966411"/>
+              <a:ext cx="1440366" cy="1153747"/>
+              <a:chOff x="2007940" y="4434046"/>
+              <a:chExt cx="1440366" cy="1153747"/>
+            </a:xfrm>
+          </p:grpSpPr>
+          <p:grpSp>
+            <p:nvGrpSpPr>
+              <p:cNvPr id="18" name="Group 17"/>
+              <p:cNvGrpSpPr/>
+              <p:nvPr/>
+            </p:nvGrpSpPr>
+            <p:grpSpPr>
+              <a:xfrm>
+                <a:off x="2007940" y="4434046"/>
+                <a:ext cx="1440366" cy="1153747"/>
+                <a:chOff x="3124200" y="1905279"/>
+                <a:chExt cx="1440366" cy="814887"/>
+              </a:xfrm>
+            </p:grpSpPr>
+            <p:sp>
+              <p:nvSpPr>
+                <p:cNvPr id="21" name="Rectangle 20"/>
+                <p:cNvSpPr/>
+                <p:nvPr/>
+              </p:nvSpPr>
+              <p:spPr>
+                <a:xfrm>
+                  <a:off x="3124200" y="1905279"/>
+                  <a:ext cx="1440366" cy="814887"/>
+                </a:xfrm>
+                <a:prstGeom prst="rect">
+                  <a:avLst/>
+                </a:prstGeom>
+                <a:solidFill>
+                  <a:srgbClr val="000000"/>
+                </a:solidFill>
+                <a:ln w="9525">
+                  <a:solidFill>
+                    <a:schemeClr val="tx1"/>
+                  </a:solidFill>
+                </a:ln>
+              </p:spPr>
+              <p:style>
+                <a:lnRef idx="2">
+                  <a:schemeClr val="accent1">
+                    <a:shade val="50000"/>
+                  </a:schemeClr>
+                </a:lnRef>
+                <a:fillRef idx="1">
+                  <a:schemeClr val="accent1"/>
+                </a:fillRef>
+                <a:effectRef idx="0">
+                  <a:schemeClr val="accent1"/>
+                </a:effectRef>
+                <a:fontRef idx="minor">
+                  <a:schemeClr val="lt1"/>
+                </a:fontRef>
+              </p:style>
+              <p:txBody>
+                <a:bodyPr rtlCol="0" anchor="ctr"/>
+                <a:lstStyle/>
+                <a:p>
+                  <a:pPr algn="ctr"/>
+                  <a:endParaRPr lang="en-US" dirty="0">
+                    <a:solidFill>
+                      <a:schemeClr val="bg1"/>
+                    </a:solidFill>
+                  </a:endParaRPr>
+                </a:p>
+              </p:txBody>
+            </p:sp>
+            <p:sp>
+              <p:nvSpPr>
+                <p:cNvPr id="22" name="TextBox 21"/>
+                <p:cNvSpPr txBox="1"/>
+                <p:nvPr/>
+              </p:nvSpPr>
+              <p:spPr>
+                <a:xfrm>
+                  <a:off x="3124200" y="1915582"/>
+                  <a:ext cx="1440366" cy="179340"/>
+                </a:xfrm>
+                <a:prstGeom prst="rect">
+                  <a:avLst/>
+                </a:prstGeom>
+                <a:noFill/>
+                <a:ln>
+                  <a:noFill/>
+                </a:ln>
+              </p:spPr>
+              <p:txBody>
+                <a:bodyPr wrap="square" rtlCol="0">
+                  <a:spAutoFit/>
+                </a:bodyPr>
+                <a:lstStyle/>
+                <a:p>
+                  <a:pPr algn="ctr"/>
+                  <a:r>
+                    <a:rPr lang="en-US" sz="1050" dirty="0" smtClean="0">
+                      <a:solidFill>
+                        <a:schemeClr val="bg1"/>
+                      </a:solidFill>
+                    </a:rPr>
+                    <a:t>Metadata Profiler</a:t>
+                  </a:r>
+                  <a:endParaRPr lang="en-US" sz="1050" dirty="0">
+                    <a:solidFill>
+                      <a:schemeClr val="bg1"/>
+                    </a:solidFill>
+                  </a:endParaRPr>
+                </a:p>
+              </p:txBody>
+            </p:sp>
+          </p:grpSp>
+          <p:sp>
+            <p:nvSpPr>
+              <p:cNvPr id="15" name="TextBox 14"/>
+              <p:cNvSpPr txBox="1"/>
+              <p:nvPr/>
+            </p:nvSpPr>
+            <p:spPr>
+              <a:xfrm>
+                <a:off x="2211855" y="4720450"/>
+                <a:ext cx="1082599" cy="215444"/>
+              </a:xfrm>
+              <a:prstGeom prst="rect">
+                <a:avLst/>
+              </a:prstGeom>
+              <a:solidFill>
+                <a:schemeClr val="bg1">
+                  <a:lumMod val="65000"/>
+                </a:schemeClr>
+              </a:solidFill>
+              <a:ln>
+                <a:solidFill>
+                  <a:schemeClr val="tx1"/>
+                </a:solidFill>
+              </a:ln>
+            </p:spPr>
+            <p:txBody>
+              <a:bodyPr wrap="square" rtlCol="0">
+                <a:spAutoFit/>
+              </a:bodyPr>
+              <a:lstStyle/>
+              <a:p>
+                <a:pPr algn="ctr"/>
+                <a:r>
+                  <a:rPr lang="en-US" sz="800" dirty="0" smtClean="0"/>
+                  <a:t>General Profiler</a:t>
+                </a:r>
+                <a:endParaRPr lang="en-US" sz="800" dirty="0"/>
+              </a:p>
+            </p:txBody>
+          </p:sp>
+          <p:sp>
+            <p:nvSpPr>
+              <p:cNvPr id="86" name="TextBox 85"/>
+              <p:cNvSpPr txBox="1"/>
+              <p:nvPr/>
+            </p:nvSpPr>
+            <p:spPr>
+              <a:xfrm>
+                <a:off x="2218133" y="4972877"/>
+                <a:ext cx="1082599" cy="215444"/>
+              </a:xfrm>
+              <a:prstGeom prst="rect">
+                <a:avLst/>
+              </a:prstGeom>
+              <a:solidFill>
+                <a:schemeClr val="bg1">
+                  <a:lumMod val="65000"/>
+                </a:schemeClr>
+              </a:solidFill>
+              <a:ln>
+                <a:solidFill>
+                  <a:schemeClr val="tx1"/>
+                </a:solidFill>
+              </a:ln>
+            </p:spPr>
+            <p:txBody>
+              <a:bodyPr wrap="square" rtlCol="0">
+                <a:spAutoFit/>
+              </a:bodyPr>
+              <a:lstStyle/>
+              <a:p>
+                <a:pPr algn="ctr"/>
+                <a:r>
+                  <a:rPr lang="en-US" sz="800" dirty="0" smtClean="0"/>
+                  <a:t>Ownership Profiler</a:t>
+                </a:r>
+                <a:endParaRPr lang="en-US" sz="800" dirty="0"/>
+              </a:p>
+            </p:txBody>
+          </p:sp>
+          <p:sp>
+            <p:nvSpPr>
+              <p:cNvPr id="87" name="TextBox 86"/>
+              <p:cNvSpPr txBox="1"/>
+              <p:nvPr/>
+            </p:nvSpPr>
+            <p:spPr>
+              <a:xfrm>
+                <a:off x="2213298" y="5222037"/>
+                <a:ext cx="1082599" cy="215444"/>
+              </a:xfrm>
+              <a:prstGeom prst="rect">
+                <a:avLst/>
+              </a:prstGeom>
+              <a:solidFill>
+                <a:schemeClr val="bg1">
+                  <a:lumMod val="65000"/>
+                </a:schemeClr>
+              </a:solidFill>
+              <a:ln>
+                <a:solidFill>
+                  <a:schemeClr val="tx1"/>
+                </a:solidFill>
+              </a:ln>
+            </p:spPr>
+            <p:txBody>
+              <a:bodyPr wrap="square" rtlCol="0">
+                <a:spAutoFit/>
+              </a:bodyPr>
+              <a:lstStyle/>
+              <a:p>
+                <a:pPr algn="ctr"/>
+                <a:r>
+                  <a:rPr lang="en-US" sz="800" dirty="0" smtClean="0"/>
+                  <a:t>License Profiler</a:t>
+                </a:r>
+                <a:endParaRPr lang="en-US" sz="800" dirty="0"/>
+              </a:p>
+            </p:txBody>
+          </p:sp>
+        </p:grpSp>
+        <p:sp>
+          <p:nvSpPr>
+            <p:cNvPr id="89" name="TextBox 88"/>
+            <p:cNvSpPr txBox="1"/>
+            <p:nvPr/>
+          </p:nvSpPr>
+          <p:spPr>
+            <a:xfrm>
+              <a:off x="4238593" y="3982008"/>
+              <a:ext cx="1004295" cy="430887"/>
             </a:xfrm>
             <a:prstGeom prst="rect">
               <a:avLst/>
             </a:prstGeom>
             <a:solidFill>
-              <a:srgbClr val="FFC000">
-                <a:alpha val="21961"/>
-              </a:srgbClr>
+              <a:schemeClr val="tx1"/>
             </a:solidFill>
             <a:ln>
               <a:solidFill>
@@ -3945,62 +4390,30 @@
             <a:p>
               <a:pPr algn="ctr"/>
               <a:r>
-                <a:rPr lang="en-US" sz="700" dirty="0" smtClean="0"/>
-                <a:t>CSV Validator</a:t>
+                <a:rPr lang="en-US" sz="1100" dirty="0" smtClean="0">
+                  <a:solidFill>
+                    <a:schemeClr val="bg1"/>
+                  </a:solidFill>
+                </a:rPr>
+                <a:t>Topical Profiler</a:t>
               </a:r>
-              <a:endParaRPr lang="en-US" sz="700" dirty="0"/>
+              <a:endParaRPr lang="en-US" sz="1100" dirty="0">
+                <a:solidFill>
+                  <a:schemeClr val="bg1"/>
+                </a:solidFill>
+              </a:endParaRPr>
             </a:p>
           </p:txBody>
         </p:sp>
         <p:sp>
           <p:nvSpPr>
-            <p:cNvPr id="64" name="TextBox 63"/>
+            <p:cNvPr id="45" name="TextBox 44"/>
             <p:cNvSpPr txBox="1"/>
             <p:nvPr/>
           </p:nvSpPr>
           <p:spPr>
             <a:xfrm>
-              <a:off x="3950541" y="3522407"/>
-              <a:ext cx="930887" cy="200055"/>
-            </a:xfrm>
-            <a:prstGeom prst="rect">
-              <a:avLst/>
-            </a:prstGeom>
-            <a:solidFill>
-              <a:srgbClr val="FFC000">
-                <a:alpha val="21961"/>
-              </a:srgbClr>
-            </a:solidFill>
-            <a:ln>
-              <a:solidFill>
-                <a:schemeClr val="tx1"/>
-              </a:solidFill>
-            </a:ln>
-          </p:spPr>
-          <p:txBody>
-            <a:bodyPr wrap="square" rtlCol="0">
-              <a:spAutoFit/>
-            </a:bodyPr>
-            <a:lstStyle/>
-            <a:p>
-              <a:pPr algn="ctr"/>
-              <a:r>
-                <a:rPr lang="en-US" sz="700" dirty="0" smtClean="0"/>
-                <a:t>RDF Validator</a:t>
-              </a:r>
-              <a:endParaRPr lang="en-US" sz="700" dirty="0"/>
-            </a:p>
-          </p:txBody>
-        </p:sp>
-        <p:sp>
-          <p:nvSpPr>
-            <p:cNvPr id="65" name="TextBox 64"/>
-            <p:cNvSpPr txBox="1"/>
-            <p:nvPr/>
-          </p:nvSpPr>
-          <p:spPr>
-            <a:xfrm>
-              <a:off x="4184789" y="3551687"/>
+              <a:off x="3950541" y="4536020"/>
               <a:ext cx="344039" cy="369332"/>
             </a:xfrm>
             <a:prstGeom prst="rect">
@@ -4023,628 +4436,6 @@
           </p:txBody>
         </p:sp>
       </p:grpSp>
-      <p:sp>
-        <p:nvSpPr>
-          <p:cNvPr id="67" name="TextBox 66"/>
-          <p:cNvSpPr txBox="1"/>
-          <p:nvPr/>
-        </p:nvSpPr>
-        <p:spPr>
-          <a:xfrm>
-            <a:off x="1247066" y="1651212"/>
-            <a:ext cx="4290319" cy="246221"/>
-          </a:xfrm>
-          <a:prstGeom prst="rect">
-            <a:avLst/>
-          </a:prstGeom>
-          <a:solidFill>
-            <a:schemeClr val="bg1"/>
-          </a:solidFill>
-          <a:ln>
-            <a:solidFill>
-              <a:schemeClr val="tx1"/>
-            </a:solidFill>
-          </a:ln>
-        </p:spPr>
-        <p:txBody>
-          <a:bodyPr wrap="square" rtlCol="0">
-            <a:spAutoFit/>
-          </a:bodyPr>
-          <a:lstStyle/>
-          <a:p>
-            <a:pPr algn="ctr"/>
-            <a:r>
-              <a:rPr lang="en-US" sz="1000" dirty="0" smtClean="0"/>
-              <a:t>Dataset Crawler</a:t>
-            </a:r>
-            <a:endParaRPr lang="en-US" sz="1000" dirty="0"/>
-          </a:p>
-        </p:txBody>
-      </p:sp>
-      <p:sp>
-        <p:nvSpPr>
-          <p:cNvPr id="69" name="TextBox 68"/>
-          <p:cNvSpPr txBox="1"/>
-          <p:nvPr/>
-        </p:nvSpPr>
-        <p:spPr>
-          <a:xfrm>
-            <a:off x="5562877" y="2365235"/>
-            <a:ext cx="382812" cy="276999"/>
-          </a:xfrm>
-          <a:prstGeom prst="rect">
-            <a:avLst/>
-          </a:prstGeom>
-          <a:noFill/>
-        </p:spPr>
-        <p:txBody>
-          <a:bodyPr wrap="none" rtlCol="0">
-            <a:spAutoFit/>
-          </a:bodyPr>
-          <a:lstStyle/>
-          <a:p>
-            <a:r>
-              <a:rPr lang="en-US" sz="1200" dirty="0" smtClean="0"/>
-              <a:t>(iv)</a:t>
-            </a:r>
-            <a:endParaRPr lang="en-US" sz="1200" dirty="0"/>
-          </a:p>
-        </p:txBody>
-      </p:sp>
-      <p:grpSp>
-        <p:nvGrpSpPr>
-          <p:cNvPr id="88" name="Group 87"/>
-          <p:cNvGrpSpPr/>
-          <p:nvPr/>
-        </p:nvGrpSpPr>
-        <p:grpSpPr>
-          <a:xfrm>
-            <a:off x="1343826" y="3966411"/>
-            <a:ext cx="1440366" cy="1153747"/>
-            <a:chOff x="2007940" y="4434046"/>
-            <a:chExt cx="1440366" cy="1153747"/>
-          </a:xfrm>
-        </p:grpSpPr>
-        <p:grpSp>
-          <p:nvGrpSpPr>
-            <p:cNvPr id="18" name="Group 17"/>
-            <p:cNvGrpSpPr/>
-            <p:nvPr/>
-          </p:nvGrpSpPr>
-          <p:grpSpPr>
-            <a:xfrm>
-              <a:off x="2007940" y="4434046"/>
-              <a:ext cx="1440366" cy="1153747"/>
-              <a:chOff x="3124200" y="1905279"/>
-              <a:chExt cx="1440366" cy="814887"/>
-            </a:xfrm>
-          </p:grpSpPr>
-          <p:sp>
-            <p:nvSpPr>
-              <p:cNvPr id="21" name="Rectangle 20"/>
-              <p:cNvSpPr/>
-              <p:nvPr/>
-            </p:nvSpPr>
-            <p:spPr>
-              <a:xfrm>
-                <a:off x="3124200" y="1905279"/>
-                <a:ext cx="1440366" cy="814887"/>
-              </a:xfrm>
-              <a:prstGeom prst="rect">
-                <a:avLst/>
-              </a:prstGeom>
-              <a:solidFill>
-                <a:srgbClr val="000000"/>
-              </a:solidFill>
-              <a:ln w="9525">
-                <a:solidFill>
-                  <a:schemeClr val="tx1"/>
-                </a:solidFill>
-              </a:ln>
-            </p:spPr>
-            <p:style>
-              <a:lnRef idx="2">
-                <a:schemeClr val="accent1">
-                  <a:shade val="50000"/>
-                </a:schemeClr>
-              </a:lnRef>
-              <a:fillRef idx="1">
-                <a:schemeClr val="accent1"/>
-              </a:fillRef>
-              <a:effectRef idx="0">
-                <a:schemeClr val="accent1"/>
-              </a:effectRef>
-              <a:fontRef idx="minor">
-                <a:schemeClr val="lt1"/>
-              </a:fontRef>
-            </p:style>
-            <p:txBody>
-              <a:bodyPr rtlCol="0" anchor="ctr"/>
-              <a:lstStyle/>
-              <a:p>
-                <a:pPr algn="ctr"/>
-                <a:endParaRPr lang="en-US" dirty="0">
-                  <a:solidFill>
-                    <a:schemeClr val="bg1"/>
-                  </a:solidFill>
-                </a:endParaRPr>
-              </a:p>
-            </p:txBody>
-          </p:sp>
-          <p:sp>
-            <p:nvSpPr>
-              <p:cNvPr id="22" name="TextBox 21"/>
-              <p:cNvSpPr txBox="1"/>
-              <p:nvPr/>
-            </p:nvSpPr>
-            <p:spPr>
-              <a:xfrm>
-                <a:off x="3124200" y="1915582"/>
-                <a:ext cx="1440366" cy="179340"/>
-              </a:xfrm>
-              <a:prstGeom prst="rect">
-                <a:avLst/>
-              </a:prstGeom>
-              <a:noFill/>
-              <a:ln>
-                <a:noFill/>
-              </a:ln>
-            </p:spPr>
-            <p:txBody>
-              <a:bodyPr wrap="square" rtlCol="0">
-                <a:spAutoFit/>
-              </a:bodyPr>
-              <a:lstStyle/>
-              <a:p>
-                <a:pPr algn="ctr"/>
-                <a:r>
-                  <a:rPr lang="en-US" sz="1050" dirty="0" smtClean="0">
-                    <a:solidFill>
-                      <a:schemeClr val="bg1"/>
-                    </a:solidFill>
-                  </a:rPr>
-                  <a:t>Metadata Profiler</a:t>
-                </a:r>
-                <a:endParaRPr lang="en-US" sz="1050" dirty="0">
-                  <a:solidFill>
-                    <a:schemeClr val="bg1"/>
-                  </a:solidFill>
-                </a:endParaRPr>
-              </a:p>
-            </p:txBody>
-          </p:sp>
-        </p:grpSp>
-        <p:sp>
-          <p:nvSpPr>
-            <p:cNvPr id="15" name="TextBox 14"/>
-            <p:cNvSpPr txBox="1"/>
-            <p:nvPr/>
-          </p:nvSpPr>
-          <p:spPr>
-            <a:xfrm>
-              <a:off x="2211855" y="4720450"/>
-              <a:ext cx="1082599" cy="215444"/>
-            </a:xfrm>
-            <a:prstGeom prst="rect">
-              <a:avLst/>
-            </a:prstGeom>
-            <a:solidFill>
-              <a:schemeClr val="bg1">
-                <a:lumMod val="65000"/>
-              </a:schemeClr>
-            </a:solidFill>
-            <a:ln>
-              <a:solidFill>
-                <a:schemeClr val="tx1"/>
-              </a:solidFill>
-            </a:ln>
-          </p:spPr>
-          <p:txBody>
-            <a:bodyPr wrap="square" rtlCol="0">
-              <a:spAutoFit/>
-            </a:bodyPr>
-            <a:lstStyle/>
-            <a:p>
-              <a:pPr algn="ctr"/>
-              <a:r>
-                <a:rPr lang="en-US" sz="800" dirty="0" smtClean="0"/>
-                <a:t>General Profiler</a:t>
-              </a:r>
-              <a:endParaRPr lang="en-US" sz="800" dirty="0"/>
-            </a:p>
-          </p:txBody>
-        </p:sp>
-        <p:sp>
-          <p:nvSpPr>
-            <p:cNvPr id="86" name="TextBox 85"/>
-            <p:cNvSpPr txBox="1"/>
-            <p:nvPr/>
-          </p:nvSpPr>
-          <p:spPr>
-            <a:xfrm>
-              <a:off x="2218133" y="4972877"/>
-              <a:ext cx="1082599" cy="215444"/>
-            </a:xfrm>
-            <a:prstGeom prst="rect">
-              <a:avLst/>
-            </a:prstGeom>
-            <a:solidFill>
-              <a:schemeClr val="bg1">
-                <a:lumMod val="65000"/>
-              </a:schemeClr>
-            </a:solidFill>
-            <a:ln>
-              <a:solidFill>
-                <a:schemeClr val="tx1"/>
-              </a:solidFill>
-            </a:ln>
-          </p:spPr>
-          <p:txBody>
-            <a:bodyPr wrap="square" rtlCol="0">
-              <a:spAutoFit/>
-            </a:bodyPr>
-            <a:lstStyle/>
-            <a:p>
-              <a:pPr algn="ctr"/>
-              <a:r>
-                <a:rPr lang="en-US" sz="800" dirty="0" smtClean="0"/>
-                <a:t>Ownership Profiler</a:t>
-              </a:r>
-              <a:endParaRPr lang="en-US" sz="800" dirty="0"/>
-            </a:p>
-          </p:txBody>
-        </p:sp>
-        <p:sp>
-          <p:nvSpPr>
-            <p:cNvPr id="87" name="TextBox 86"/>
-            <p:cNvSpPr txBox="1"/>
-            <p:nvPr/>
-          </p:nvSpPr>
-          <p:spPr>
-            <a:xfrm>
-              <a:off x="2213298" y="5222037"/>
-              <a:ext cx="1082599" cy="215444"/>
-            </a:xfrm>
-            <a:prstGeom prst="rect">
-              <a:avLst/>
-            </a:prstGeom>
-            <a:solidFill>
-              <a:schemeClr val="bg1">
-                <a:lumMod val="65000"/>
-              </a:schemeClr>
-            </a:solidFill>
-            <a:ln>
-              <a:solidFill>
-                <a:schemeClr val="tx1"/>
-              </a:solidFill>
-            </a:ln>
-          </p:spPr>
-          <p:txBody>
-            <a:bodyPr wrap="square" rtlCol="0">
-              <a:spAutoFit/>
-            </a:bodyPr>
-            <a:lstStyle/>
-            <a:p>
-              <a:pPr algn="ctr"/>
-              <a:r>
-                <a:rPr lang="en-US" sz="800" dirty="0" smtClean="0"/>
-                <a:t>License Profiler</a:t>
-              </a:r>
-              <a:endParaRPr lang="en-US" sz="800" dirty="0"/>
-            </a:p>
-          </p:txBody>
-        </p:sp>
-      </p:grpSp>
-      <p:sp>
-        <p:nvSpPr>
-          <p:cNvPr id="89" name="TextBox 88"/>
-          <p:cNvSpPr txBox="1"/>
-          <p:nvPr/>
-        </p:nvSpPr>
-        <p:spPr>
-          <a:xfrm>
-            <a:off x="4238593" y="3982008"/>
-            <a:ext cx="1124255" cy="430887"/>
-          </a:xfrm>
-          <a:prstGeom prst="rect">
-            <a:avLst/>
-          </a:prstGeom>
-          <a:solidFill>
-            <a:schemeClr val="tx1"/>
-          </a:solidFill>
-          <a:ln>
-            <a:solidFill>
-              <a:schemeClr val="tx1"/>
-            </a:solidFill>
-          </a:ln>
-        </p:spPr>
-        <p:txBody>
-          <a:bodyPr wrap="square" rtlCol="0">
-            <a:spAutoFit/>
-          </a:bodyPr>
-          <a:lstStyle/>
-          <a:p>
-            <a:pPr algn="ctr"/>
-            <a:r>
-              <a:rPr lang="en-US" sz="1100" dirty="0" smtClean="0">
-                <a:solidFill>
-                  <a:schemeClr val="bg1"/>
-                </a:solidFill>
-              </a:rPr>
-              <a:t>Statistical Profiler</a:t>
-            </a:r>
-            <a:endParaRPr lang="en-US" sz="1100" dirty="0">
-              <a:solidFill>
-                <a:schemeClr val="bg1"/>
-              </a:solidFill>
-            </a:endParaRPr>
-          </a:p>
-        </p:txBody>
-      </p:sp>
-      <p:sp>
-        <p:nvSpPr>
-          <p:cNvPr id="90" name="TextBox 89"/>
-          <p:cNvSpPr txBox="1"/>
-          <p:nvPr/>
-        </p:nvSpPr>
-        <p:spPr>
-          <a:xfrm>
-            <a:off x="5577063" y="3696295"/>
-            <a:ext cx="347496" cy="276999"/>
-          </a:xfrm>
-          <a:prstGeom prst="rect">
-            <a:avLst/>
-          </a:prstGeom>
-          <a:noFill/>
-        </p:spPr>
-        <p:txBody>
-          <a:bodyPr wrap="none" rtlCol="0">
-            <a:spAutoFit/>
-          </a:bodyPr>
-          <a:lstStyle/>
-          <a:p>
-            <a:r>
-              <a:rPr lang="en-US" sz="1200" dirty="0" smtClean="0"/>
-              <a:t>(v)</a:t>
-            </a:r>
-            <a:endParaRPr lang="en-US" sz="1200" dirty="0"/>
-          </a:p>
-        </p:txBody>
-      </p:sp>
-      <p:sp>
-        <p:nvSpPr>
-          <p:cNvPr id="92" name="TextBox 91"/>
-          <p:cNvSpPr txBox="1"/>
-          <p:nvPr/>
-        </p:nvSpPr>
-        <p:spPr>
-          <a:xfrm>
-            <a:off x="1247066" y="5310029"/>
-            <a:ext cx="4290319" cy="246221"/>
-          </a:xfrm>
-          <a:prstGeom prst="rect">
-            <a:avLst/>
-          </a:prstGeom>
-          <a:solidFill>
-            <a:schemeClr val="bg1"/>
-          </a:solidFill>
-          <a:ln>
-            <a:solidFill>
-              <a:schemeClr val="tx1"/>
-            </a:solidFill>
-          </a:ln>
-        </p:spPr>
-        <p:txBody>
-          <a:bodyPr wrap="square" rtlCol="0">
-            <a:spAutoFit/>
-          </a:bodyPr>
-          <a:lstStyle/>
-          <a:p>
-            <a:pPr algn="ctr"/>
-            <a:r>
-              <a:rPr lang="en-US" sz="1000" dirty="0" smtClean="0"/>
-              <a:t>Report Generator</a:t>
-            </a:r>
-            <a:endParaRPr lang="en-US" sz="1000" dirty="0"/>
-          </a:p>
-        </p:txBody>
-      </p:sp>
-      <p:sp>
-        <p:nvSpPr>
-          <p:cNvPr id="93" name="TextBox 92"/>
-          <p:cNvSpPr txBox="1"/>
-          <p:nvPr/>
-        </p:nvSpPr>
-        <p:spPr>
-          <a:xfrm>
-            <a:off x="5576463" y="5271781"/>
-            <a:ext cx="382812" cy="276999"/>
-          </a:xfrm>
-          <a:prstGeom prst="rect">
-            <a:avLst/>
-          </a:prstGeom>
-          <a:noFill/>
-        </p:spPr>
-        <p:txBody>
-          <a:bodyPr wrap="none" rtlCol="0">
-            <a:spAutoFit/>
-          </a:bodyPr>
-          <a:lstStyle/>
-          <a:p>
-            <a:r>
-              <a:rPr lang="en-US" sz="1200" dirty="0" smtClean="0"/>
-              <a:t>(vi)</a:t>
-            </a:r>
-            <a:endParaRPr lang="en-US" sz="1200" dirty="0"/>
-          </a:p>
-        </p:txBody>
-      </p:sp>
-      <p:sp>
-        <p:nvSpPr>
-          <p:cNvPr id="45" name="TextBox 44"/>
-          <p:cNvSpPr txBox="1"/>
-          <p:nvPr/>
-        </p:nvSpPr>
-        <p:spPr>
-          <a:xfrm>
-            <a:off x="3950541" y="4536020"/>
-            <a:ext cx="344039" cy="369332"/>
-          </a:xfrm>
-          <a:prstGeom prst="rect">
-            <a:avLst/>
-          </a:prstGeom>
-          <a:noFill/>
-        </p:spPr>
-        <p:txBody>
-          <a:bodyPr wrap="none" rtlCol="0">
-            <a:spAutoFit/>
-          </a:bodyPr>
-          <a:lstStyle/>
-          <a:p>
-            <a:r>
-              <a:rPr lang="en-US" dirty="0" smtClean="0"/>
-              <a:t>…</a:t>
-            </a:r>
-            <a:endParaRPr lang="en-US" dirty="0"/>
-          </a:p>
-        </p:txBody>
-      </p:sp>
-      <p:cxnSp>
-        <p:nvCxnSpPr>
-          <p:cNvPr id="53" name="Straight Arrow Connector 52"/>
-          <p:cNvCxnSpPr/>
-          <p:nvPr/>
-        </p:nvCxnSpPr>
-        <p:spPr>
-          <a:xfrm>
-            <a:off x="1068298" y="2250935"/>
-            <a:ext cx="0" cy="228600"/>
-          </a:xfrm>
-          <a:prstGeom prst="straightConnector1">
-            <a:avLst/>
-          </a:prstGeom>
-          <a:ln>
-            <a:headEnd type="none"/>
-            <a:tailEnd type="triangle"/>
-          </a:ln>
-        </p:spPr>
-        <p:style>
-          <a:lnRef idx="1">
-            <a:schemeClr val="dk1"/>
-          </a:lnRef>
-          <a:fillRef idx="0">
-            <a:schemeClr val="dk1"/>
-          </a:fillRef>
-          <a:effectRef idx="0">
-            <a:schemeClr val="dk1"/>
-          </a:effectRef>
-          <a:fontRef idx="minor">
-            <a:schemeClr val="tx1"/>
-          </a:fontRef>
-        </p:style>
-      </p:cxnSp>
-      <p:cxnSp>
-        <p:nvCxnSpPr>
-          <p:cNvPr id="57" name="Straight Arrow Connector 56"/>
-          <p:cNvCxnSpPr/>
-          <p:nvPr/>
-        </p:nvCxnSpPr>
-        <p:spPr>
-          <a:xfrm>
-            <a:off x="1070108" y="3474820"/>
-            <a:ext cx="0" cy="228600"/>
-          </a:xfrm>
-          <a:prstGeom prst="straightConnector1">
-            <a:avLst/>
-          </a:prstGeom>
-          <a:ln>
-            <a:headEnd type="none"/>
-            <a:tailEnd type="triangle"/>
-          </a:ln>
-        </p:spPr>
-        <p:style>
-          <a:lnRef idx="1">
-            <a:schemeClr val="dk1"/>
-          </a:lnRef>
-          <a:fillRef idx="0">
-            <a:schemeClr val="dk1"/>
-          </a:fillRef>
-          <a:effectRef idx="0">
-            <a:schemeClr val="dk1"/>
-          </a:effectRef>
-          <a:fontRef idx="minor">
-            <a:schemeClr val="tx1"/>
-          </a:fontRef>
-        </p:style>
-      </p:cxnSp>
-      <p:cxnSp>
-        <p:nvCxnSpPr>
-          <p:cNvPr id="70" name="Straight Arrow Connector 69"/>
-          <p:cNvCxnSpPr/>
-          <p:nvPr/>
-        </p:nvCxnSpPr>
-        <p:spPr>
-          <a:xfrm>
-            <a:off x="1069508" y="5195675"/>
-            <a:ext cx="0" cy="228600"/>
-          </a:xfrm>
-          <a:prstGeom prst="straightConnector1">
-            <a:avLst/>
-          </a:prstGeom>
-          <a:ln>
-            <a:headEnd type="none"/>
-            <a:tailEnd type="triangle"/>
-          </a:ln>
-        </p:spPr>
-        <p:style>
-          <a:lnRef idx="1">
-            <a:schemeClr val="dk1"/>
-          </a:lnRef>
-          <a:fillRef idx="0">
-            <a:schemeClr val="dk1"/>
-          </a:fillRef>
-          <a:effectRef idx="0">
-            <a:schemeClr val="dk1"/>
-          </a:effectRef>
-          <a:fontRef idx="minor">
-            <a:schemeClr val="tx1"/>
-          </a:fontRef>
-        </p:style>
-      </p:cxnSp>
-      <p:cxnSp>
-        <p:nvCxnSpPr>
-          <p:cNvPr id="71" name="Straight Arrow Connector 70"/>
-          <p:cNvCxnSpPr/>
-          <p:nvPr/>
-        </p:nvCxnSpPr>
-        <p:spPr>
-          <a:xfrm>
-            <a:off x="3257483" y="1288150"/>
-            <a:ext cx="0" cy="228600"/>
-          </a:xfrm>
-          <a:prstGeom prst="straightConnector1">
-            <a:avLst/>
-          </a:prstGeom>
-          <a:ln>
-            <a:headEnd type="none"/>
-            <a:tailEnd type="triangle"/>
-          </a:ln>
-        </p:spPr>
-        <p:style>
-          <a:lnRef idx="1">
-            <a:schemeClr val="dk1"/>
-          </a:lnRef>
-          <a:fillRef idx="0">
-            <a:schemeClr val="dk1"/>
-          </a:fillRef>
-          <a:effectRef idx="0">
-            <a:schemeClr val="dk1"/>
-          </a:effectRef>
-          <a:fontRef idx="minor">
-            <a:schemeClr val="tx1"/>
-          </a:fontRef>
-        </p:style>
-      </p:cxnSp>
     </p:spTree>
     <p:extLst>
       <p:ext uri="{BB962C8B-B14F-4D97-AF65-F5344CB8AC3E}">

</xml_diff>

<commit_message>
editing related work section
</commit_message>
<xml_diff>
--- a/Papers/An Extensible Framework to Validate and Build Dataset Profiles/figures/architecutre_diagram.pptx
+++ b/Papers/An Extensible Framework to Validate and Build Dataset Profiles/figures/architecutre_diagram.pptx
@@ -3949,7 +3949,11 @@
               <a:pPr algn="ctr"/>
               <a:r>
                 <a:rPr lang="en-US" sz="1000" dirty="0" smtClean="0"/>
-                <a:t>Report Generator</a:t>
+                <a:t>Profile and Report </a:t>
+              </a:r>
+              <a:r>
+                <a:rPr lang="en-US" sz="1000" dirty="0" smtClean="0"/>
+                <a:t>Generator</a:t>
               </a:r>
               <a:endParaRPr lang="en-US" sz="1000" dirty="0"/>
             </a:p>
@@ -4002,11 +4006,12 @@
               <a:pPr algn="ctr"/>
               <a:r>
                 <a:rPr lang="en-US" sz="1000" dirty="0" smtClean="0"/>
-                <a:t>Profile Validator and Generator</a:t>
+                <a:t>Profile </a:t>
               </a:r>
-            </a:p>
-            <a:p>
-              <a:pPr algn="ctr"/>
+              <a:r>
+                <a:rPr lang="en-US" sz="1000" dirty="0" smtClean="0"/>
+                <a:t>Validator</a:t>
+              </a:r>
               <a:endParaRPr lang="en-US" sz="1000" dirty="0"/>
             </a:p>
             <a:p>
@@ -4032,6 +4037,10 @@
             <a:p>
               <a:pPr algn="ctr"/>
               <a:endParaRPr lang="en-US" sz="1000" dirty="0"/>
+            </a:p>
+            <a:p>
+              <a:pPr algn="ctr"/>
+              <a:endParaRPr lang="en-US" sz="1000" dirty="0" smtClean="0"/>
             </a:p>
             <a:p>
               <a:pPr algn="ctr"/>

</xml_diff>

<commit_message>
updating arch diagram and fixing metadata extraction section
</commit_message>
<xml_diff>
--- a/Papers/An Extensible Framework to Validate and Build Dataset Profiles/figures/architecutre_diagram.pptx
+++ b/Papers/An Extensible Framework to Validate and Build Dataset Profiles/figures/architecutre_diagram.pptx
@@ -288,7 +288,7 @@
           <a:p>
             <a:fld id="{544FCF9B-4D64-E146-AC3C-205DEAA733C4}" type="datetimeFigureOut">
               <a:rPr lang="en-US" smtClean="0"/>
-              <a:t>12/12/14</a:t>
+              <a:t>14/01/15</a:t>
             </a:fld>
             <a:endParaRPr lang="en-US"/>
           </a:p>
@@ -458,7 +458,7 @@
           <a:p>
             <a:fld id="{544FCF9B-4D64-E146-AC3C-205DEAA733C4}" type="datetimeFigureOut">
               <a:rPr lang="en-US" smtClean="0"/>
-              <a:t>12/12/14</a:t>
+              <a:t>14/01/15</a:t>
             </a:fld>
             <a:endParaRPr lang="en-US"/>
           </a:p>
@@ -638,7 +638,7 @@
           <a:p>
             <a:fld id="{544FCF9B-4D64-E146-AC3C-205DEAA733C4}" type="datetimeFigureOut">
               <a:rPr lang="en-US" smtClean="0"/>
-              <a:t>12/12/14</a:t>
+              <a:t>14/01/15</a:t>
             </a:fld>
             <a:endParaRPr lang="en-US"/>
           </a:p>
@@ -808,7 +808,7 @@
           <a:p>
             <a:fld id="{544FCF9B-4D64-E146-AC3C-205DEAA733C4}" type="datetimeFigureOut">
               <a:rPr lang="en-US" smtClean="0"/>
-              <a:t>12/12/14</a:t>
+              <a:t>14/01/15</a:t>
             </a:fld>
             <a:endParaRPr lang="en-US"/>
           </a:p>
@@ -1054,7 +1054,7 @@
           <a:p>
             <a:fld id="{544FCF9B-4D64-E146-AC3C-205DEAA733C4}" type="datetimeFigureOut">
               <a:rPr lang="en-US" smtClean="0"/>
-              <a:t>12/12/14</a:t>
+              <a:t>14/01/15</a:t>
             </a:fld>
             <a:endParaRPr lang="en-US"/>
           </a:p>
@@ -1342,7 +1342,7 @@
           <a:p>
             <a:fld id="{544FCF9B-4D64-E146-AC3C-205DEAA733C4}" type="datetimeFigureOut">
               <a:rPr lang="en-US" smtClean="0"/>
-              <a:t>12/12/14</a:t>
+              <a:t>14/01/15</a:t>
             </a:fld>
             <a:endParaRPr lang="en-US"/>
           </a:p>
@@ -1764,7 +1764,7 @@
           <a:p>
             <a:fld id="{544FCF9B-4D64-E146-AC3C-205DEAA733C4}" type="datetimeFigureOut">
               <a:rPr lang="en-US" smtClean="0"/>
-              <a:t>12/12/14</a:t>
+              <a:t>14/01/15</a:t>
             </a:fld>
             <a:endParaRPr lang="en-US"/>
           </a:p>
@@ -1882,7 +1882,7 @@
           <a:p>
             <a:fld id="{544FCF9B-4D64-E146-AC3C-205DEAA733C4}" type="datetimeFigureOut">
               <a:rPr lang="en-US" smtClean="0"/>
-              <a:t>12/12/14</a:t>
+              <a:t>14/01/15</a:t>
             </a:fld>
             <a:endParaRPr lang="en-US"/>
           </a:p>
@@ -1977,7 +1977,7 @@
           <a:p>
             <a:fld id="{544FCF9B-4D64-E146-AC3C-205DEAA733C4}" type="datetimeFigureOut">
               <a:rPr lang="en-US" smtClean="0"/>
-              <a:t>12/12/14</a:t>
+              <a:t>14/01/15</a:t>
             </a:fld>
             <a:endParaRPr lang="en-US"/>
           </a:p>
@@ -2254,7 +2254,7 @@
           <a:p>
             <a:fld id="{544FCF9B-4D64-E146-AC3C-205DEAA733C4}" type="datetimeFigureOut">
               <a:rPr lang="en-US" smtClean="0"/>
-              <a:t>12/12/14</a:t>
+              <a:t>14/01/15</a:t>
             </a:fld>
             <a:endParaRPr lang="en-US"/>
           </a:p>
@@ -2507,7 +2507,7 @@
           <a:p>
             <a:fld id="{544FCF9B-4D64-E146-AC3C-205DEAA733C4}" type="datetimeFigureOut">
               <a:rPr lang="en-US" smtClean="0"/>
-              <a:t>12/12/14</a:t>
+              <a:t>14/01/15</a:t>
             </a:fld>
             <a:endParaRPr lang="en-US"/>
           </a:p>
@@ -2720,7 +2720,7 @@
           <a:p>
             <a:fld id="{544FCF9B-4D64-E146-AC3C-205DEAA733C4}" type="datetimeFigureOut">
               <a:rPr lang="en-US" smtClean="0"/>
-              <a:t>12/12/14</a:t>
+              <a:t>14/01/15</a:t>
             </a:fld>
             <a:endParaRPr lang="en-US"/>
           </a:p>
@@ -3881,7 +3881,7 @@
         </p:nvGrpSpPr>
         <p:grpSpPr>
           <a:xfrm>
-            <a:off x="1247066" y="4491391"/>
+            <a:off x="1247066" y="4797431"/>
             <a:ext cx="4711478" cy="276999"/>
             <a:chOff x="1247066" y="5287076"/>
             <a:chExt cx="4711478" cy="276999"/>
@@ -3949,11 +3949,7 @@
               <a:pPr algn="ctr"/>
               <a:r>
                 <a:rPr lang="en-US" sz="1000" dirty="0" smtClean="0"/>
-                <a:t>Profile and Report </a:t>
-              </a:r>
-              <a:r>
-                <a:rPr lang="en-US" sz="1000" dirty="0" smtClean="0"/>
-                <a:t>Generator</a:t>
+                <a:t>Profile and Report Generator</a:t>
               </a:r>
               <a:endParaRPr lang="en-US" sz="1000" dirty="0"/>
             </a:p>
@@ -3969,7 +3965,7 @@
         <p:grpSpPr>
           <a:xfrm>
             <a:off x="1244621" y="2892300"/>
-            <a:ext cx="4698623" cy="1531908"/>
+            <a:ext cx="4698623" cy="1835904"/>
             <a:chOff x="1247066" y="3665905"/>
             <a:chExt cx="4698623" cy="1531908"/>
           </a:xfrm>
@@ -4006,11 +4002,7 @@
               <a:pPr algn="ctr"/>
               <a:r>
                 <a:rPr lang="en-US" sz="1000" dirty="0" smtClean="0"/>
-                <a:t>Profile </a:t>
-              </a:r>
-              <a:r>
-                <a:rPr lang="en-US" sz="1000" dirty="0" smtClean="0"/>
-                <a:t>Validator</a:t>
+                <a:t>Profile Validator</a:t>
               </a:r>
               <a:endParaRPr lang="en-US" sz="1000" dirty="0"/>
             </a:p>
@@ -4255,7 +4247,7 @@
             </p:nvSpPr>
             <p:spPr>
               <a:xfrm>
-                <a:off x="2211855" y="4720450"/>
+                <a:off x="2211855" y="4650226"/>
                 <a:ext cx="1082599" cy="215444"/>
               </a:xfrm>
               <a:prstGeom prst="rect">
@@ -4295,7 +4287,7 @@
             </p:nvSpPr>
             <p:spPr>
               <a:xfrm>
-                <a:off x="2218133" y="4972877"/>
+                <a:off x="2210483" y="4883500"/>
                 <a:ext cx="1082599" cy="215444"/>
               </a:xfrm>
               <a:prstGeom prst="rect">
@@ -4335,8 +4327,8 @@
             </p:nvSpPr>
             <p:spPr>
               <a:xfrm>
-                <a:off x="2213298" y="5222037"/>
-                <a:ext cx="1082599" cy="215444"/>
+                <a:off x="2213298" y="5126277"/>
+                <a:ext cx="1082599" cy="179770"/>
               </a:xfrm>
               <a:prstGeom prst="rect">
                 <a:avLst/>
@@ -4361,7 +4353,7 @@
                 <a:pPr algn="ctr"/>
                 <a:r>
                   <a:rPr lang="en-US" sz="800" dirty="0" smtClean="0"/>
-                  <a:t>License Profiler</a:t>
+                  <a:t>Access Profiler</a:t>
                 </a:r>
                 <a:endParaRPr lang="en-US" sz="800" dirty="0"/>
               </a:p>
@@ -4445,6 +4437,46 @@
           </p:txBody>
         </p:sp>
       </p:grpSp>
+      <p:sp>
+        <p:nvSpPr>
+          <p:cNvPr id="42" name="TextBox 41"/>
+          <p:cNvSpPr txBox="1"/>
+          <p:nvPr/>
+        </p:nvSpPr>
+        <p:spPr>
+          <a:xfrm>
+            <a:off x="1551574" y="4356503"/>
+            <a:ext cx="1082599" cy="215444"/>
+          </a:xfrm>
+          <a:prstGeom prst="rect">
+            <a:avLst/>
+          </a:prstGeom>
+          <a:solidFill>
+            <a:schemeClr val="bg1">
+              <a:lumMod val="65000"/>
+            </a:schemeClr>
+          </a:solidFill>
+          <a:ln>
+            <a:solidFill>
+              <a:schemeClr val="tx1"/>
+            </a:solidFill>
+          </a:ln>
+        </p:spPr>
+        <p:txBody>
+          <a:bodyPr wrap="square" rtlCol="0">
+            <a:spAutoFit/>
+          </a:bodyPr>
+          <a:lstStyle/>
+          <a:p>
+            <a:pPr algn="ctr"/>
+            <a:r>
+              <a:rPr lang="en-US" sz="800" dirty="0" smtClean="0"/>
+              <a:t>Provenance Profiler</a:t>
+            </a:r>
+            <a:endParaRPr lang="en-US" sz="800" dirty="0"/>
+          </a:p>
+        </p:txBody>
+      </p:sp>
     </p:spTree>
     <p:extLst>
       <p:ext uri="{BB962C8B-B14F-4D97-AF65-F5344CB8AC3E}">

</xml_diff>

<commit_message>
fixing the wrong steps number in the architecture diagram
</commit_message>
<xml_diff>
--- a/Papers/An Extensible Framework to Validate and Build Dataset Profiles/figures/architecutre_diagram.pptx
+++ b/Papers/An Extensible Framework to Validate and Build Dataset Profiles/figures/architecutre_diagram.pptx
@@ -288,7 +288,7 @@
           <a:p>
             <a:fld id="{544FCF9B-4D64-E146-AC3C-205DEAA733C4}" type="datetimeFigureOut">
               <a:rPr lang="en-US" smtClean="0"/>
-              <a:t>14/01/15</a:t>
+              <a:t>04/03/15</a:t>
             </a:fld>
             <a:endParaRPr lang="en-US"/>
           </a:p>
@@ -458,7 +458,7 @@
           <a:p>
             <a:fld id="{544FCF9B-4D64-E146-AC3C-205DEAA733C4}" type="datetimeFigureOut">
               <a:rPr lang="en-US" smtClean="0"/>
-              <a:t>14/01/15</a:t>
+              <a:t>04/03/15</a:t>
             </a:fld>
             <a:endParaRPr lang="en-US"/>
           </a:p>
@@ -638,7 +638,7 @@
           <a:p>
             <a:fld id="{544FCF9B-4D64-E146-AC3C-205DEAA733C4}" type="datetimeFigureOut">
               <a:rPr lang="en-US" smtClean="0"/>
-              <a:t>14/01/15</a:t>
+              <a:t>04/03/15</a:t>
             </a:fld>
             <a:endParaRPr lang="en-US"/>
           </a:p>
@@ -808,7 +808,7 @@
           <a:p>
             <a:fld id="{544FCF9B-4D64-E146-AC3C-205DEAA733C4}" type="datetimeFigureOut">
               <a:rPr lang="en-US" smtClean="0"/>
-              <a:t>14/01/15</a:t>
+              <a:t>04/03/15</a:t>
             </a:fld>
             <a:endParaRPr lang="en-US"/>
           </a:p>
@@ -1054,7 +1054,7 @@
           <a:p>
             <a:fld id="{544FCF9B-4D64-E146-AC3C-205DEAA733C4}" type="datetimeFigureOut">
               <a:rPr lang="en-US" smtClean="0"/>
-              <a:t>14/01/15</a:t>
+              <a:t>04/03/15</a:t>
             </a:fld>
             <a:endParaRPr lang="en-US"/>
           </a:p>
@@ -1342,7 +1342,7 @@
           <a:p>
             <a:fld id="{544FCF9B-4D64-E146-AC3C-205DEAA733C4}" type="datetimeFigureOut">
               <a:rPr lang="en-US" smtClean="0"/>
-              <a:t>14/01/15</a:t>
+              <a:t>04/03/15</a:t>
             </a:fld>
             <a:endParaRPr lang="en-US"/>
           </a:p>
@@ -1764,7 +1764,7 @@
           <a:p>
             <a:fld id="{544FCF9B-4D64-E146-AC3C-205DEAA733C4}" type="datetimeFigureOut">
               <a:rPr lang="en-US" smtClean="0"/>
-              <a:t>14/01/15</a:t>
+              <a:t>04/03/15</a:t>
             </a:fld>
             <a:endParaRPr lang="en-US"/>
           </a:p>
@@ -1882,7 +1882,7 @@
           <a:p>
             <a:fld id="{544FCF9B-4D64-E146-AC3C-205DEAA733C4}" type="datetimeFigureOut">
               <a:rPr lang="en-US" smtClean="0"/>
-              <a:t>14/01/15</a:t>
+              <a:t>04/03/15</a:t>
             </a:fld>
             <a:endParaRPr lang="en-US"/>
           </a:p>
@@ -1977,7 +1977,7 @@
           <a:p>
             <a:fld id="{544FCF9B-4D64-E146-AC3C-205DEAA733C4}" type="datetimeFigureOut">
               <a:rPr lang="en-US" smtClean="0"/>
-              <a:t>14/01/15</a:t>
+              <a:t>04/03/15</a:t>
             </a:fld>
             <a:endParaRPr lang="en-US"/>
           </a:p>
@@ -2254,7 +2254,7 @@
           <a:p>
             <a:fld id="{544FCF9B-4D64-E146-AC3C-205DEAA733C4}" type="datetimeFigureOut">
               <a:rPr lang="en-US" smtClean="0"/>
-              <a:t>14/01/15</a:t>
+              <a:t>04/03/15</a:t>
             </a:fld>
             <a:endParaRPr lang="en-US"/>
           </a:p>
@@ -2507,7 +2507,7 @@
           <a:p>
             <a:fld id="{544FCF9B-4D64-E146-AC3C-205DEAA733C4}" type="datetimeFigureOut">
               <a:rPr lang="en-US" smtClean="0"/>
-              <a:t>14/01/15</a:t>
+              <a:t>04/03/15</a:t>
             </a:fld>
             <a:endParaRPr lang="en-US"/>
           </a:p>
@@ -2720,7 +2720,7 @@
           <a:p>
             <a:fld id="{544FCF9B-4D64-E146-AC3C-205DEAA733C4}" type="datetimeFigureOut">
               <a:rPr lang="en-US" smtClean="0"/>
-              <a:t>14/01/15</a:t>
+              <a:t>04/03/15</a:t>
             </a:fld>
             <a:endParaRPr lang="en-US"/>
           </a:p>
@@ -3097,16 +3097,699 @@
       </p:grpSpPr>
       <p:grpSp>
         <p:nvGrpSpPr>
+          <p:cNvPr id="4" name="Group 3"/>
+          <p:cNvGrpSpPr/>
+          <p:nvPr/>
+        </p:nvGrpSpPr>
+        <p:grpSpPr>
+          <a:xfrm>
+            <a:off x="4182364" y="447523"/>
+            <a:ext cx="3645170" cy="1299231"/>
+            <a:chOff x="1188592" y="2340917"/>
+            <a:chExt cx="4345033" cy="1245731"/>
+          </a:xfrm>
+        </p:grpSpPr>
+        <p:grpSp>
+          <p:nvGrpSpPr>
+            <p:cNvPr id="68" name="Group 67"/>
+            <p:cNvGrpSpPr/>
+            <p:nvPr/>
+          </p:nvGrpSpPr>
+          <p:grpSpPr>
+            <a:xfrm>
+              <a:off x="1243306" y="2378887"/>
+              <a:ext cx="4290319" cy="1207761"/>
+              <a:chOff x="1243306" y="2692120"/>
+              <a:chExt cx="4290319" cy="1207761"/>
+            </a:xfrm>
+          </p:grpSpPr>
+          <p:sp>
+            <p:nvSpPr>
+              <p:cNvPr id="52" name="TextBox 51"/>
+              <p:cNvSpPr txBox="1"/>
+              <p:nvPr/>
+            </p:nvSpPr>
+            <p:spPr>
+              <a:xfrm>
+                <a:off x="1243306" y="2692120"/>
+                <a:ext cx="4290319" cy="1121392"/>
+              </a:xfrm>
+              <a:prstGeom prst="rect">
+                <a:avLst/>
+              </a:prstGeom>
+              <a:solidFill>
+                <a:schemeClr val="bg1"/>
+              </a:solidFill>
+              <a:ln>
+                <a:solidFill>
+                  <a:schemeClr val="tx1"/>
+                </a:solidFill>
+              </a:ln>
+            </p:spPr>
+            <p:txBody>
+              <a:bodyPr wrap="square" rtlCol="0">
+                <a:spAutoFit/>
+              </a:bodyPr>
+              <a:lstStyle/>
+              <a:p>
+                <a:pPr algn="ctr"/>
+                <a:r>
+                  <a:rPr lang="en-US" sz="1000" dirty="0" smtClean="0"/>
+                  <a:t>Instance and Resource Extractor</a:t>
+                </a:r>
+              </a:p>
+              <a:p>
+                <a:pPr algn="ctr"/>
+                <a:endParaRPr lang="en-US" sz="1000" dirty="0"/>
+              </a:p>
+              <a:p>
+                <a:pPr algn="ctr"/>
+                <a:endParaRPr lang="en-US" sz="1000" dirty="0" smtClean="0"/>
+              </a:p>
+              <a:p>
+                <a:pPr algn="ctr"/>
+                <a:endParaRPr lang="en-US" sz="1000" dirty="0"/>
+              </a:p>
+              <a:p>
+                <a:pPr algn="ctr"/>
+                <a:endParaRPr lang="en-US" sz="1000" dirty="0" smtClean="0"/>
+              </a:p>
+              <a:p>
+                <a:pPr algn="ctr"/>
+                <a:endParaRPr lang="en-US" sz="1000" dirty="0" smtClean="0"/>
+              </a:p>
+              <a:p>
+                <a:pPr algn="ctr"/>
+                <a:endParaRPr lang="en-US" sz="1000" dirty="0"/>
+              </a:p>
+            </p:txBody>
+          </p:sp>
+          <p:grpSp>
+            <p:nvGrpSpPr>
+              <p:cNvPr id="61" name="Group 60"/>
+              <p:cNvGrpSpPr/>
+              <p:nvPr/>
+            </p:nvGrpSpPr>
+            <p:grpSpPr>
+              <a:xfrm>
+                <a:off x="1379232" y="2951164"/>
+                <a:ext cx="1475242" cy="948717"/>
+                <a:chOff x="1379232" y="2685074"/>
+                <a:chExt cx="1475242" cy="948717"/>
+              </a:xfrm>
+            </p:grpSpPr>
+            <p:grpSp>
+              <p:nvGrpSpPr>
+                <p:cNvPr id="60" name="Group 59"/>
+                <p:cNvGrpSpPr/>
+                <p:nvPr/>
+              </p:nvGrpSpPr>
+              <p:grpSpPr>
+                <a:xfrm>
+                  <a:off x="1379232" y="2685074"/>
+                  <a:ext cx="1475242" cy="775535"/>
+                  <a:chOff x="4996772" y="272588"/>
+                  <a:chExt cx="1437893" cy="921698"/>
+                </a:xfrm>
+              </p:grpSpPr>
+              <p:sp>
+                <p:nvSpPr>
+                  <p:cNvPr id="39" name="TextBox 38"/>
+                  <p:cNvSpPr txBox="1"/>
+                  <p:nvPr/>
+                </p:nvSpPr>
+                <p:spPr>
+                  <a:xfrm>
+                    <a:off x="4996772" y="272588"/>
+                    <a:ext cx="1437893" cy="292625"/>
+                  </a:xfrm>
+                  <a:prstGeom prst="rect">
+                    <a:avLst/>
+                  </a:prstGeom>
+                  <a:solidFill>
+                    <a:schemeClr val="tx1"/>
+                  </a:solidFill>
+                  <a:ln>
+                    <a:solidFill>
+                      <a:schemeClr val="tx1"/>
+                    </a:solidFill>
+                  </a:ln>
+                </p:spPr>
+                <p:txBody>
+                  <a:bodyPr wrap="square" rtlCol="0">
+                    <a:spAutoFit/>
+                  </a:bodyPr>
+                  <a:lstStyle/>
+                  <a:p>
+                    <a:pPr algn="ctr"/>
+                    <a:r>
+                      <a:rPr lang="en-US" sz="1000" dirty="0" smtClean="0">
+                        <a:solidFill>
+                          <a:schemeClr val="bg1"/>
+                        </a:solidFill>
+                      </a:rPr>
+                      <a:t>Sampler</a:t>
+                    </a:r>
+                    <a:endParaRPr lang="en-US" sz="1000" dirty="0">
+                      <a:solidFill>
+                        <a:schemeClr val="bg1"/>
+                      </a:solidFill>
+                    </a:endParaRPr>
+                  </a:p>
+                </p:txBody>
+              </p:sp>
+              <p:sp>
+                <p:nvSpPr>
+                  <p:cNvPr id="55" name="TextBox 54"/>
+                  <p:cNvSpPr txBox="1"/>
+                  <p:nvPr/>
+                </p:nvSpPr>
+                <p:spPr>
+                  <a:xfrm>
+                    <a:off x="5010437" y="626209"/>
+                    <a:ext cx="1415339" cy="258655"/>
+                  </a:xfrm>
+                  <a:prstGeom prst="rect">
+                    <a:avLst/>
+                  </a:prstGeom>
+                  <a:solidFill>
+                    <a:srgbClr val="FFC000">
+                      <a:alpha val="21961"/>
+                    </a:srgbClr>
+                  </a:solidFill>
+                  <a:ln>
+                    <a:solidFill>
+                      <a:schemeClr val="tx1"/>
+                    </a:solidFill>
+                  </a:ln>
+                </p:spPr>
+                <p:txBody>
+                  <a:bodyPr wrap="square" rtlCol="0">
+                    <a:spAutoFit/>
+                  </a:bodyPr>
+                  <a:lstStyle/>
+                  <a:p>
+                    <a:pPr algn="ctr">
+                      <a:lnSpc>
+                        <a:spcPct val="130000"/>
+                      </a:lnSpc>
+                    </a:pPr>
+                    <a:r>
+                      <a:rPr lang="en-US" sz="700" dirty="0" smtClean="0"/>
+                      <a:t>Random Sampling</a:t>
+                    </a:r>
+                    <a:endParaRPr lang="en-US" sz="700" dirty="0"/>
+                  </a:p>
+                </p:txBody>
+              </p:sp>
+              <p:sp>
+                <p:nvSpPr>
+                  <p:cNvPr id="56" name="TextBox 55"/>
+                  <p:cNvSpPr txBox="1"/>
+                  <p:nvPr/>
+                </p:nvSpPr>
+                <p:spPr>
+                  <a:xfrm>
+                    <a:off x="5010437" y="935631"/>
+                    <a:ext cx="1415339" cy="258655"/>
+                  </a:xfrm>
+                  <a:prstGeom prst="rect">
+                    <a:avLst/>
+                  </a:prstGeom>
+                  <a:solidFill>
+                    <a:srgbClr val="FFC000">
+                      <a:alpha val="21961"/>
+                    </a:srgbClr>
+                  </a:solidFill>
+                  <a:ln>
+                    <a:solidFill>
+                      <a:schemeClr val="tx1"/>
+                    </a:solidFill>
+                  </a:ln>
+                </p:spPr>
+                <p:txBody>
+                  <a:bodyPr wrap="square" rtlCol="0">
+                    <a:spAutoFit/>
+                  </a:bodyPr>
+                  <a:lstStyle/>
+                  <a:p>
+                    <a:pPr algn="ctr">
+                      <a:lnSpc>
+                        <a:spcPct val="130000"/>
+                      </a:lnSpc>
+                    </a:pPr>
+                    <a:r>
+                      <a:rPr lang="en-US" sz="700" dirty="0" smtClean="0"/>
+                      <a:t>Weighted Sampling</a:t>
+                    </a:r>
+                    <a:endParaRPr lang="en-US" sz="700" dirty="0"/>
+                  </a:p>
+                </p:txBody>
+              </p:sp>
+            </p:grpSp>
+            <p:sp>
+              <p:nvSpPr>
+                <p:cNvPr id="58" name="TextBox 57"/>
+                <p:cNvSpPr txBox="1"/>
+                <p:nvPr/>
+              </p:nvSpPr>
+              <p:spPr>
+                <a:xfrm>
+                  <a:off x="1840460" y="3264459"/>
+                  <a:ext cx="344039" cy="369332"/>
+                </a:xfrm>
+                <a:prstGeom prst="rect">
+                  <a:avLst/>
+                </a:prstGeom>
+                <a:noFill/>
+              </p:spPr>
+              <p:txBody>
+                <a:bodyPr wrap="none" rtlCol="0">
+                  <a:spAutoFit/>
+                </a:bodyPr>
+                <a:lstStyle/>
+                <a:p>
+                  <a:r>
+                    <a:rPr lang="en-US" dirty="0" smtClean="0"/>
+                    <a:t>…</a:t>
+                  </a:r>
+                  <a:endParaRPr lang="en-US" dirty="0"/>
+                </a:p>
+              </p:txBody>
+            </p:sp>
+          </p:grpSp>
+          <p:sp>
+            <p:nvSpPr>
+              <p:cNvPr id="62" name="TextBox 61"/>
+              <p:cNvSpPr txBox="1"/>
+              <p:nvPr/>
+            </p:nvSpPr>
+            <p:spPr>
+              <a:xfrm>
+                <a:off x="3702554" y="2963599"/>
+                <a:ext cx="1475242" cy="246221"/>
+              </a:xfrm>
+              <a:prstGeom prst="rect">
+                <a:avLst/>
+              </a:prstGeom>
+              <a:solidFill>
+                <a:schemeClr val="tx1"/>
+              </a:solidFill>
+              <a:ln>
+                <a:solidFill>
+                  <a:schemeClr val="tx1"/>
+                </a:solidFill>
+              </a:ln>
+            </p:spPr>
+            <p:txBody>
+              <a:bodyPr wrap="square" rtlCol="0">
+                <a:spAutoFit/>
+              </a:bodyPr>
+              <a:lstStyle/>
+              <a:p>
+                <a:pPr algn="ctr"/>
+                <a:r>
+                  <a:rPr lang="en-US" sz="1000" dirty="0" smtClean="0">
+                    <a:solidFill>
+                      <a:schemeClr val="bg1"/>
+                    </a:solidFill>
+                  </a:rPr>
+                  <a:t>Validator</a:t>
+                </a:r>
+                <a:endParaRPr lang="en-US" sz="1000" dirty="0">
+                  <a:solidFill>
+                    <a:schemeClr val="bg1"/>
+                  </a:solidFill>
+                </a:endParaRPr>
+              </a:p>
+            </p:txBody>
+          </p:sp>
+          <p:sp>
+            <p:nvSpPr>
+              <p:cNvPr id="63" name="TextBox 62"/>
+              <p:cNvSpPr txBox="1"/>
+              <p:nvPr/>
+            </p:nvSpPr>
+            <p:spPr>
+              <a:xfrm>
+                <a:off x="3702554" y="3255307"/>
+                <a:ext cx="1475241" cy="217638"/>
+              </a:xfrm>
+              <a:prstGeom prst="rect">
+                <a:avLst/>
+              </a:prstGeom>
+              <a:solidFill>
+                <a:srgbClr val="FFC000">
+                  <a:alpha val="21961"/>
+                </a:srgbClr>
+              </a:solidFill>
+              <a:ln>
+                <a:solidFill>
+                  <a:schemeClr val="tx1"/>
+                </a:solidFill>
+              </a:ln>
+            </p:spPr>
+            <p:txBody>
+              <a:bodyPr wrap="square" rtlCol="0">
+                <a:spAutoFit/>
+              </a:bodyPr>
+              <a:lstStyle/>
+              <a:p>
+                <a:pPr algn="ctr">
+                  <a:lnSpc>
+                    <a:spcPct val="130000"/>
+                  </a:lnSpc>
+                </a:pPr>
+                <a:r>
+                  <a:rPr lang="en-US" sz="700" dirty="0" smtClean="0"/>
+                  <a:t>CSV Validator</a:t>
+                </a:r>
+                <a:endParaRPr lang="en-US" sz="700" dirty="0"/>
+              </a:p>
+            </p:txBody>
+          </p:sp>
+          <p:sp>
+            <p:nvSpPr>
+              <p:cNvPr id="64" name="TextBox 63"/>
+              <p:cNvSpPr txBox="1"/>
+              <p:nvPr/>
+            </p:nvSpPr>
+            <p:spPr>
+              <a:xfrm>
+                <a:off x="3702554" y="3515071"/>
+                <a:ext cx="1475241" cy="217638"/>
+              </a:xfrm>
+              <a:prstGeom prst="rect">
+                <a:avLst/>
+              </a:prstGeom>
+              <a:solidFill>
+                <a:srgbClr val="FFC000">
+                  <a:alpha val="21961"/>
+                </a:srgbClr>
+              </a:solidFill>
+              <a:ln>
+                <a:solidFill>
+                  <a:schemeClr val="tx1"/>
+                </a:solidFill>
+              </a:ln>
+            </p:spPr>
+            <p:txBody>
+              <a:bodyPr wrap="square" rtlCol="0">
+                <a:spAutoFit/>
+              </a:bodyPr>
+              <a:lstStyle/>
+              <a:p>
+                <a:pPr algn="ctr">
+                  <a:lnSpc>
+                    <a:spcPct val="130000"/>
+                  </a:lnSpc>
+                </a:pPr>
+                <a:r>
+                  <a:rPr lang="en-US" sz="700" dirty="0" smtClean="0"/>
+                  <a:t>RDF Validator</a:t>
+                </a:r>
+                <a:endParaRPr lang="en-US" sz="700" dirty="0"/>
+              </a:p>
+            </p:txBody>
+          </p:sp>
+          <p:sp>
+            <p:nvSpPr>
+              <p:cNvPr id="65" name="TextBox 64"/>
+              <p:cNvSpPr txBox="1"/>
+              <p:nvPr/>
+            </p:nvSpPr>
+            <p:spPr>
+              <a:xfrm>
+                <a:off x="4184789" y="3529679"/>
+                <a:ext cx="344039" cy="369332"/>
+              </a:xfrm>
+              <a:prstGeom prst="rect">
+                <a:avLst/>
+              </a:prstGeom>
+              <a:noFill/>
+            </p:spPr>
+            <p:txBody>
+              <a:bodyPr wrap="none" rtlCol="0">
+                <a:spAutoFit/>
+              </a:bodyPr>
+              <a:lstStyle/>
+              <a:p>
+                <a:r>
+                  <a:rPr lang="en-US" dirty="0" smtClean="0"/>
+                  <a:t>…</a:t>
+                </a:r>
+                <a:endParaRPr lang="en-US" dirty="0"/>
+              </a:p>
+            </p:txBody>
+          </p:sp>
+        </p:grpSp>
+        <p:sp>
+          <p:nvSpPr>
+            <p:cNvPr id="54" name="TextBox 53"/>
+            <p:cNvSpPr txBox="1"/>
+            <p:nvPr/>
+          </p:nvSpPr>
+          <p:spPr>
+            <a:xfrm>
+              <a:off x="1188592" y="2340917"/>
+              <a:ext cx="383939" cy="276999"/>
+            </a:xfrm>
+            <a:prstGeom prst="rect">
+              <a:avLst/>
+            </a:prstGeom>
+            <a:noFill/>
+          </p:spPr>
+          <p:txBody>
+            <a:bodyPr wrap="none" rtlCol="0">
+              <a:spAutoFit/>
+            </a:bodyPr>
+            <a:lstStyle/>
+            <a:p>
+              <a:r>
+                <a:rPr lang="en-US" sz="1200" dirty="0" smtClean="0"/>
+                <a:t>(iii)</a:t>
+              </a:r>
+              <a:endParaRPr lang="en-US" sz="1200" dirty="0"/>
+            </a:p>
+          </p:txBody>
+        </p:sp>
+      </p:grpSp>
+      <p:sp>
+        <p:nvSpPr>
+          <p:cNvPr id="51" name="TextBox 50"/>
+          <p:cNvSpPr txBox="1"/>
+          <p:nvPr/>
+        </p:nvSpPr>
+        <p:spPr>
+          <a:xfrm>
+            <a:off x="3071927" y="470359"/>
+            <a:ext cx="66512" cy="814373"/>
+          </a:xfrm>
+          <a:prstGeom prst="rect">
+            <a:avLst/>
+          </a:prstGeom>
+          <a:noFill/>
+          <a:ln>
+            <a:noFill/>
+          </a:ln>
+        </p:spPr>
+        <p:txBody>
+          <a:bodyPr wrap="none" rtlCol="0">
+            <a:spAutoFit/>
+          </a:bodyPr>
+          <a:lstStyle/>
+          <a:p>
+            <a:r>
+              <a:rPr lang="en-US" sz="1200" dirty="0" smtClean="0"/>
+              <a:t>(ii)</a:t>
+            </a:r>
+            <a:endParaRPr lang="en-US" sz="1200" dirty="0"/>
+          </a:p>
+        </p:txBody>
+      </p:sp>
+      <p:sp>
+        <p:nvSpPr>
+          <p:cNvPr id="67" name="TextBox 66"/>
+          <p:cNvSpPr txBox="1"/>
+          <p:nvPr/>
+        </p:nvSpPr>
+        <p:spPr>
+          <a:xfrm>
+            <a:off x="3188438" y="863299"/>
+            <a:ext cx="818528" cy="372728"/>
+          </a:xfrm>
+          <a:prstGeom prst="rect">
+            <a:avLst/>
+          </a:prstGeom>
+          <a:solidFill>
+            <a:schemeClr val="bg1"/>
+          </a:solidFill>
+          <a:ln>
+            <a:noFill/>
+          </a:ln>
+        </p:spPr>
+        <p:txBody>
+          <a:bodyPr wrap="square" rtlCol="0" anchor="ctr">
+            <a:spAutoFit/>
+          </a:bodyPr>
+          <a:lstStyle/>
+          <a:p>
+            <a:pPr algn="ctr"/>
+            <a:r>
+              <a:rPr lang="en-US" sz="1000" dirty="0"/>
+              <a:t>Metadata Extractor</a:t>
+            </a:r>
+          </a:p>
+        </p:txBody>
+      </p:sp>
+      <p:grpSp>
+        <p:nvGrpSpPr>
+          <p:cNvPr id="10" name="Group 9"/>
+          <p:cNvGrpSpPr/>
+          <p:nvPr/>
+        </p:nvGrpSpPr>
+        <p:grpSpPr>
+          <a:xfrm>
+            <a:off x="3273958" y="2140372"/>
+            <a:ext cx="994454" cy="994435"/>
+            <a:chOff x="3296908" y="2140372"/>
+            <a:chExt cx="994454" cy="994435"/>
+          </a:xfrm>
+        </p:grpSpPr>
+        <p:sp>
+          <p:nvSpPr>
+            <p:cNvPr id="70" name="Rectangle 69"/>
+            <p:cNvSpPr/>
+            <p:nvPr/>
+          </p:nvSpPr>
+          <p:spPr>
+            <a:xfrm>
+              <a:off x="3296908" y="2140372"/>
+              <a:ext cx="994454" cy="994435"/>
+            </a:xfrm>
+            <a:prstGeom prst="rect">
+              <a:avLst/>
+            </a:prstGeom>
+            <a:solidFill>
+              <a:schemeClr val="bg1">
+                <a:lumMod val="50000"/>
+              </a:schemeClr>
+            </a:solidFill>
+            <a:ln>
+              <a:solidFill>
+                <a:schemeClr val="tx1"/>
+              </a:solidFill>
+            </a:ln>
+            <a:effectLst/>
+          </p:spPr>
+          <p:style>
+            <a:lnRef idx="1">
+              <a:schemeClr val="accent1"/>
+            </a:lnRef>
+            <a:fillRef idx="3">
+              <a:schemeClr val="accent1"/>
+            </a:fillRef>
+            <a:effectRef idx="2">
+              <a:schemeClr val="accent1"/>
+            </a:effectRef>
+            <a:fontRef idx="minor">
+              <a:schemeClr val="lt1"/>
+            </a:fontRef>
+          </p:style>
+          <p:txBody>
+            <a:bodyPr rtlCol="0" anchor="ctr"/>
+            <a:lstStyle/>
+            <a:p>
+              <a:pPr algn="ctr"/>
+              <a:endParaRPr lang="en-US"/>
+            </a:p>
+          </p:txBody>
+        </p:sp>
+        <p:sp>
+          <p:nvSpPr>
+            <p:cNvPr id="14" name="TextBox 13"/>
+            <p:cNvSpPr txBox="1"/>
+            <p:nvPr/>
+          </p:nvSpPr>
+          <p:spPr>
+            <a:xfrm>
+              <a:off x="3329689" y="2359556"/>
+              <a:ext cx="898576" cy="430887"/>
+            </a:xfrm>
+            <a:prstGeom prst="rect">
+              <a:avLst/>
+            </a:prstGeom>
+            <a:noFill/>
+            <a:ln>
+              <a:noFill/>
+            </a:ln>
+          </p:spPr>
+          <p:txBody>
+            <a:bodyPr wrap="square" rtlCol="0">
+              <a:spAutoFit/>
+            </a:bodyPr>
+            <a:lstStyle/>
+            <a:p>
+              <a:pPr algn="ctr"/>
+              <a:r>
+                <a:rPr lang="en-US" sz="1100" dirty="0" smtClean="0">
+                  <a:solidFill>
+                    <a:schemeClr val="bg1"/>
+                  </a:solidFill>
+                </a:rPr>
+                <a:t>Statistical Profiler</a:t>
+              </a:r>
+              <a:endParaRPr lang="en-US" sz="1100" dirty="0">
+                <a:solidFill>
+                  <a:schemeClr val="bg1"/>
+                </a:solidFill>
+              </a:endParaRPr>
+            </a:p>
+          </p:txBody>
+        </p:sp>
+      </p:grpSp>
+      <p:sp>
+        <p:nvSpPr>
+          <p:cNvPr id="45" name="TextBox 44"/>
+          <p:cNvSpPr txBox="1"/>
+          <p:nvPr/>
+        </p:nvSpPr>
+        <p:spPr>
+          <a:xfrm>
+            <a:off x="2145138" y="3019016"/>
+            <a:ext cx="530971" cy="442623"/>
+          </a:xfrm>
+          <a:prstGeom prst="rect">
+            <a:avLst/>
+          </a:prstGeom>
+          <a:noFill/>
+        </p:spPr>
+        <p:txBody>
+          <a:bodyPr wrap="none" rtlCol="0">
+            <a:spAutoFit/>
+          </a:bodyPr>
+          <a:lstStyle/>
+          <a:p>
+            <a:r>
+              <a:rPr lang="en-US" dirty="0" smtClean="0"/>
+              <a:t>…</a:t>
+            </a:r>
+            <a:endParaRPr lang="en-US" dirty="0"/>
+          </a:p>
+        </p:txBody>
+      </p:sp>
+      <p:grpSp>
+        <p:nvGrpSpPr>
           <p:cNvPr id="59" name="Group 58"/>
           <p:cNvGrpSpPr/>
           <p:nvPr/>
         </p:nvGrpSpPr>
         <p:grpSpPr>
           <a:xfrm>
-            <a:off x="2602096" y="642258"/>
-            <a:ext cx="1777604" cy="645892"/>
-            <a:chOff x="2481146" y="806691"/>
-            <a:chExt cx="1777604" cy="645892"/>
+            <a:off x="963943" y="473946"/>
+            <a:ext cx="1985904" cy="1133350"/>
+            <a:chOff x="2272846" y="748361"/>
+            <a:chExt cx="1985904" cy="704222"/>
           </a:xfrm>
         </p:grpSpPr>
         <p:sp>
@@ -3118,7 +3801,7 @@
           <p:spPr>
             <a:xfrm>
               <a:off x="2481146" y="852419"/>
-              <a:ext cx="1447800" cy="230832"/>
+              <a:ext cx="1447800" cy="143431"/>
             </a:xfrm>
             <a:prstGeom prst="rect">
               <a:avLst/>
@@ -3127,9 +3810,7 @@
               <a:schemeClr val="bg1"/>
             </a:solidFill>
             <a:ln>
-              <a:solidFill>
-                <a:schemeClr val="tx1"/>
-              </a:solidFill>
+              <a:noFill/>
             </a:ln>
           </p:spPr>
           <p:txBody>
@@ -3141,7 +3822,7 @@
               <a:pPr algn="ctr"/>
               <a:r>
                 <a:rPr lang="en-US" sz="900" dirty="0" smtClean="0"/>
-                <a:t>Data Portal Identification</a:t>
+                <a:t>Data Portal Identifier</a:t>
               </a:r>
               <a:endParaRPr lang="en-US" sz="900" dirty="0"/>
             </a:p>
@@ -3305,7 +3986,7 @@
           </p:nvSpPr>
           <p:spPr>
             <a:xfrm>
-              <a:off x="3886267" y="806691"/>
+              <a:off x="2272846" y="748361"/>
               <a:ext cx="313307" cy="276999"/>
             </a:xfrm>
             <a:prstGeom prst="rect">
@@ -3328,523 +4009,120 @@
           </p:txBody>
         </p:sp>
       </p:grpSp>
+      <p:sp>
+        <p:nvSpPr>
+          <p:cNvPr id="12" name="Rectangle 11"/>
+          <p:cNvSpPr/>
+          <p:nvPr/>
+        </p:nvSpPr>
+        <p:spPr>
+          <a:xfrm>
+            <a:off x="3066063" y="485661"/>
+            <a:ext cx="994454" cy="1219780"/>
+          </a:xfrm>
+          <a:prstGeom prst="rect">
+            <a:avLst/>
+          </a:prstGeom>
+          <a:noFill/>
+          <a:ln>
+            <a:solidFill>
+              <a:schemeClr val="tx1"/>
+            </a:solidFill>
+          </a:ln>
+          <a:effectLst/>
+        </p:spPr>
+        <p:style>
+          <a:lnRef idx="1">
+            <a:schemeClr val="accent1"/>
+          </a:lnRef>
+          <a:fillRef idx="3">
+            <a:schemeClr val="accent1"/>
+          </a:fillRef>
+          <a:effectRef idx="2">
+            <a:schemeClr val="accent1"/>
+          </a:effectRef>
+          <a:fontRef idx="minor">
+            <a:schemeClr val="lt1"/>
+          </a:fontRef>
+        </p:style>
+        <p:txBody>
+          <a:bodyPr rtlCol="0" anchor="ctr"/>
+          <a:lstStyle/>
+          <a:p>
+            <a:pPr algn="ctr"/>
+            <a:endParaRPr lang="en-US"/>
+          </a:p>
+        </p:txBody>
+      </p:sp>
+      <p:sp>
+        <p:nvSpPr>
+          <p:cNvPr id="78" name="Rectangle 77"/>
+          <p:cNvSpPr/>
+          <p:nvPr/>
+        </p:nvSpPr>
+        <p:spPr>
+          <a:xfrm>
+            <a:off x="963943" y="485661"/>
+            <a:ext cx="2008854" cy="1219780"/>
+          </a:xfrm>
+          <a:prstGeom prst="rect">
+            <a:avLst/>
+          </a:prstGeom>
+          <a:noFill/>
+          <a:ln>
+            <a:solidFill>
+              <a:schemeClr val="tx1"/>
+            </a:solidFill>
+          </a:ln>
+          <a:effectLst/>
+        </p:spPr>
+        <p:style>
+          <a:lnRef idx="1">
+            <a:schemeClr val="accent1"/>
+          </a:lnRef>
+          <a:fillRef idx="3">
+            <a:schemeClr val="accent1"/>
+          </a:fillRef>
+          <a:effectRef idx="2">
+            <a:schemeClr val="accent1"/>
+          </a:effectRef>
+          <a:fontRef idx="minor">
+            <a:schemeClr val="lt1"/>
+          </a:fontRef>
+        </p:style>
+        <p:txBody>
+          <a:bodyPr rtlCol="0" anchor="ctr"/>
+          <a:lstStyle/>
+          <a:p>
+            <a:pPr algn="ctr"/>
+            <a:endParaRPr lang="en-US"/>
+          </a:p>
+        </p:txBody>
+      </p:sp>
       <p:grpSp>
         <p:nvGrpSpPr>
-          <p:cNvPr id="4" name="Group 3"/>
+          <p:cNvPr id="2" name="Group 1"/>
           <p:cNvGrpSpPr/>
           <p:nvPr/>
         </p:nvGrpSpPr>
         <p:grpSpPr>
           <a:xfrm>
-            <a:off x="1233443" y="1608161"/>
-            <a:ext cx="4696250" cy="1303414"/>
-            <a:chOff x="1243306" y="2304372"/>
-            <a:chExt cx="4696250" cy="1303414"/>
+            <a:off x="956293" y="1798844"/>
+            <a:ext cx="1012022" cy="1477373"/>
+            <a:chOff x="-624917" y="5300859"/>
+            <a:chExt cx="4323010" cy="276999"/>
           </a:xfrm>
         </p:grpSpPr>
         <p:sp>
           <p:nvSpPr>
-            <p:cNvPr id="54" name="TextBox 53"/>
+            <p:cNvPr id="92" name="TextBox 91"/>
             <p:cNvSpPr txBox="1"/>
             <p:nvPr/>
           </p:nvSpPr>
           <p:spPr>
             <a:xfrm>
-              <a:off x="5555617" y="2304372"/>
-              <a:ext cx="383939" cy="276999"/>
-            </a:xfrm>
-            <a:prstGeom prst="rect">
-              <a:avLst/>
-            </a:prstGeom>
-            <a:noFill/>
-          </p:spPr>
-          <p:txBody>
-            <a:bodyPr wrap="none" rtlCol="0">
-              <a:spAutoFit/>
-            </a:bodyPr>
-            <a:lstStyle/>
-            <a:p>
-              <a:r>
-                <a:rPr lang="en-US" sz="1200" dirty="0" smtClean="0"/>
-                <a:t>(iii)</a:t>
-              </a:r>
-              <a:endParaRPr lang="en-US" sz="1200" dirty="0"/>
-            </a:p>
-          </p:txBody>
-        </p:sp>
-        <p:grpSp>
-          <p:nvGrpSpPr>
-            <p:cNvPr id="68" name="Group 67"/>
-            <p:cNvGrpSpPr/>
-            <p:nvPr/>
-          </p:nvGrpSpPr>
-          <p:grpSpPr>
-            <a:xfrm>
-              <a:off x="1243306" y="2378887"/>
-              <a:ext cx="4290319" cy="1228899"/>
-              <a:chOff x="1243306" y="2692120"/>
-              <a:chExt cx="4290319" cy="1228899"/>
-            </a:xfrm>
-          </p:grpSpPr>
-          <p:sp>
-            <p:nvSpPr>
-              <p:cNvPr id="52" name="TextBox 51"/>
-              <p:cNvSpPr txBox="1"/>
-              <p:nvPr/>
-            </p:nvSpPr>
-            <p:spPr>
-              <a:xfrm>
-                <a:off x="1243306" y="2692120"/>
-                <a:ext cx="4290319" cy="1169551"/>
-              </a:xfrm>
-              <a:prstGeom prst="rect">
-                <a:avLst/>
-              </a:prstGeom>
-              <a:solidFill>
-                <a:schemeClr val="bg1"/>
-              </a:solidFill>
-              <a:ln>
-                <a:solidFill>
-                  <a:schemeClr val="tx1"/>
-                </a:solidFill>
-              </a:ln>
-            </p:spPr>
-            <p:txBody>
-              <a:bodyPr wrap="square" rtlCol="0">
-                <a:spAutoFit/>
-              </a:bodyPr>
-              <a:lstStyle/>
-              <a:p>
-                <a:pPr algn="ctr"/>
-                <a:r>
-                  <a:rPr lang="en-US" sz="1000" dirty="0" smtClean="0"/>
-                  <a:t>Instance and Resource Extraction</a:t>
-                </a:r>
-              </a:p>
-              <a:p>
-                <a:pPr algn="ctr"/>
-                <a:endParaRPr lang="en-US" sz="1000" dirty="0"/>
-              </a:p>
-              <a:p>
-                <a:pPr algn="ctr"/>
-                <a:endParaRPr lang="en-US" sz="1000" dirty="0" smtClean="0"/>
-              </a:p>
-              <a:p>
-                <a:pPr algn="ctr"/>
-                <a:endParaRPr lang="en-US" sz="1000" dirty="0"/>
-              </a:p>
-              <a:p>
-                <a:pPr algn="ctr"/>
-                <a:endParaRPr lang="en-US" sz="1000" dirty="0" smtClean="0"/>
-              </a:p>
-              <a:p>
-                <a:pPr algn="ctr"/>
-                <a:endParaRPr lang="en-US" sz="1000" dirty="0" smtClean="0"/>
-              </a:p>
-              <a:p>
-                <a:pPr algn="ctr"/>
-                <a:endParaRPr lang="en-US" sz="1000" dirty="0"/>
-              </a:p>
-            </p:txBody>
-          </p:sp>
-          <p:grpSp>
-            <p:nvGrpSpPr>
-              <p:cNvPr id="61" name="Group 60"/>
-              <p:cNvGrpSpPr/>
-              <p:nvPr/>
-            </p:nvGrpSpPr>
-            <p:grpSpPr>
-              <a:xfrm>
-                <a:off x="1379234" y="2980508"/>
-                <a:ext cx="1475242" cy="926709"/>
-                <a:chOff x="1379234" y="2714418"/>
-                <a:chExt cx="1475242" cy="926709"/>
-              </a:xfrm>
-            </p:grpSpPr>
-            <p:grpSp>
-              <p:nvGrpSpPr>
-                <p:cNvPr id="60" name="Group 59"/>
-                <p:cNvGrpSpPr/>
-                <p:nvPr/>
-              </p:nvGrpSpPr>
-              <p:grpSpPr>
-                <a:xfrm>
-                  <a:off x="1379234" y="2714418"/>
-                  <a:ext cx="1475242" cy="696884"/>
-                  <a:chOff x="4996774" y="307464"/>
-                  <a:chExt cx="1437893" cy="828222"/>
-                </a:xfrm>
-              </p:grpSpPr>
-              <p:sp>
-                <p:nvSpPr>
-                  <p:cNvPr id="39" name="TextBox 38"/>
-                  <p:cNvSpPr txBox="1"/>
-                  <p:nvPr/>
-                </p:nvSpPr>
-                <p:spPr>
-                  <a:xfrm>
-                    <a:off x="4996774" y="307464"/>
-                    <a:ext cx="1437893" cy="292625"/>
-                  </a:xfrm>
-                  <a:prstGeom prst="rect">
-                    <a:avLst/>
-                  </a:prstGeom>
-                  <a:solidFill>
-                    <a:schemeClr val="tx1"/>
-                  </a:solidFill>
-                  <a:ln>
-                    <a:solidFill>
-                      <a:schemeClr val="tx1"/>
-                    </a:solidFill>
-                  </a:ln>
-                </p:spPr>
-                <p:txBody>
-                  <a:bodyPr wrap="square" rtlCol="0">
-                    <a:spAutoFit/>
-                  </a:bodyPr>
-                  <a:lstStyle/>
-                  <a:p>
-                    <a:pPr algn="ctr"/>
-                    <a:r>
-                      <a:rPr lang="en-US" sz="1000" dirty="0" smtClean="0">
-                        <a:solidFill>
-                          <a:schemeClr val="bg1"/>
-                        </a:solidFill>
-                      </a:rPr>
-                      <a:t>Sampler</a:t>
-                    </a:r>
-                    <a:endParaRPr lang="en-US" sz="1000" dirty="0">
-                      <a:solidFill>
-                        <a:schemeClr val="bg1"/>
-                      </a:solidFill>
-                    </a:endParaRPr>
-                  </a:p>
-                </p:txBody>
-              </p:sp>
-              <p:sp>
-                <p:nvSpPr>
-                  <p:cNvPr id="55" name="TextBox 54"/>
-                  <p:cNvSpPr txBox="1"/>
-                  <p:nvPr/>
-                </p:nvSpPr>
-                <p:spPr>
-                  <a:xfrm>
-                    <a:off x="5226579" y="652364"/>
-                    <a:ext cx="907320" cy="200055"/>
-                  </a:xfrm>
-                  <a:prstGeom prst="rect">
-                    <a:avLst/>
-                  </a:prstGeom>
-                  <a:solidFill>
-                    <a:srgbClr val="FFC000">
-                      <a:alpha val="21961"/>
-                    </a:srgbClr>
-                  </a:solidFill>
-                  <a:ln>
-                    <a:solidFill>
-                      <a:schemeClr val="tx1"/>
-                    </a:solidFill>
-                  </a:ln>
-                </p:spPr>
-                <p:txBody>
-                  <a:bodyPr wrap="square" rtlCol="0">
-                    <a:spAutoFit/>
-                  </a:bodyPr>
-                  <a:lstStyle/>
-                  <a:p>
-                    <a:pPr algn="ctr"/>
-                    <a:r>
-                      <a:rPr lang="en-US" sz="700" dirty="0" smtClean="0"/>
-                      <a:t>Random Sampling</a:t>
-                    </a:r>
-                    <a:endParaRPr lang="en-US" sz="700" dirty="0"/>
-                  </a:p>
-                </p:txBody>
-              </p:sp>
-              <p:sp>
-                <p:nvSpPr>
-                  <p:cNvPr id="56" name="TextBox 55"/>
-                  <p:cNvSpPr txBox="1"/>
-                  <p:nvPr/>
-                </p:nvSpPr>
-                <p:spPr>
-                  <a:xfrm>
-                    <a:off x="5226579" y="935631"/>
-                    <a:ext cx="907320" cy="200055"/>
-                  </a:xfrm>
-                  <a:prstGeom prst="rect">
-                    <a:avLst/>
-                  </a:prstGeom>
-                  <a:solidFill>
-                    <a:srgbClr val="FFC000">
-                      <a:alpha val="21961"/>
-                    </a:srgbClr>
-                  </a:solidFill>
-                  <a:ln>
-                    <a:solidFill>
-                      <a:schemeClr val="tx1"/>
-                    </a:solidFill>
-                  </a:ln>
-                </p:spPr>
-                <p:txBody>
-                  <a:bodyPr wrap="square" rtlCol="0">
-                    <a:spAutoFit/>
-                  </a:bodyPr>
-                  <a:lstStyle/>
-                  <a:p>
-                    <a:pPr algn="ctr"/>
-                    <a:r>
-                      <a:rPr lang="en-US" sz="700" dirty="0" smtClean="0"/>
-                      <a:t>Weighted Sampling</a:t>
-                    </a:r>
-                    <a:endParaRPr lang="en-US" sz="700" dirty="0"/>
-                  </a:p>
-                </p:txBody>
-              </p:sp>
-            </p:grpSp>
-            <p:sp>
-              <p:nvSpPr>
-                <p:cNvPr id="58" name="TextBox 57"/>
-                <p:cNvSpPr txBox="1"/>
-                <p:nvPr/>
-              </p:nvSpPr>
-              <p:spPr>
-                <a:xfrm>
-                  <a:off x="1867816" y="3271795"/>
-                  <a:ext cx="344039" cy="369332"/>
-                </a:xfrm>
-                <a:prstGeom prst="rect">
-                  <a:avLst/>
-                </a:prstGeom>
-                <a:noFill/>
-              </p:spPr>
-              <p:txBody>
-                <a:bodyPr wrap="none" rtlCol="0">
-                  <a:spAutoFit/>
-                </a:bodyPr>
-                <a:lstStyle/>
-                <a:p>
-                  <a:r>
-                    <a:rPr lang="en-US" dirty="0" smtClean="0"/>
-                    <a:t>…</a:t>
-                  </a:r>
-                  <a:endParaRPr lang="en-US" dirty="0"/>
-                </a:p>
-              </p:txBody>
-            </p:sp>
-          </p:grpSp>
-          <p:sp>
-            <p:nvSpPr>
-              <p:cNvPr id="62" name="TextBox 61"/>
-              <p:cNvSpPr txBox="1"/>
-              <p:nvPr/>
-            </p:nvSpPr>
-            <p:spPr>
-              <a:xfrm>
-                <a:off x="3702554" y="2985607"/>
-                <a:ext cx="1475242" cy="246221"/>
-              </a:xfrm>
-              <a:prstGeom prst="rect">
-                <a:avLst/>
-              </a:prstGeom>
-              <a:solidFill>
-                <a:schemeClr val="tx1"/>
-              </a:solidFill>
-              <a:ln>
-                <a:solidFill>
-                  <a:schemeClr val="tx1"/>
-                </a:solidFill>
-              </a:ln>
-            </p:spPr>
-            <p:txBody>
-              <a:bodyPr wrap="square" rtlCol="0">
-                <a:spAutoFit/>
-              </a:bodyPr>
-              <a:lstStyle/>
-              <a:p>
-                <a:pPr algn="ctr"/>
-                <a:r>
-                  <a:rPr lang="en-US" sz="1000" dirty="0" smtClean="0">
-                    <a:solidFill>
-                      <a:schemeClr val="bg1"/>
-                    </a:solidFill>
-                  </a:rPr>
-                  <a:t>Validator</a:t>
-                </a:r>
-                <a:endParaRPr lang="en-US" sz="1000" dirty="0">
-                  <a:solidFill>
-                    <a:schemeClr val="bg1"/>
-                  </a:solidFill>
-                </a:endParaRPr>
-              </a:p>
-            </p:txBody>
-          </p:sp>
-          <p:sp>
-            <p:nvSpPr>
-              <p:cNvPr id="63" name="TextBox 62"/>
-              <p:cNvSpPr txBox="1"/>
-              <p:nvPr/>
-            </p:nvSpPr>
-            <p:spPr>
-              <a:xfrm>
-                <a:off x="3950541" y="3269980"/>
-                <a:ext cx="930887" cy="200055"/>
-              </a:xfrm>
-              <a:prstGeom prst="rect">
-                <a:avLst/>
-              </a:prstGeom>
-              <a:solidFill>
-                <a:srgbClr val="FFC000">
-                  <a:alpha val="21961"/>
-                </a:srgbClr>
-              </a:solidFill>
-              <a:ln>
-                <a:solidFill>
-                  <a:schemeClr val="tx1"/>
-                </a:solidFill>
-              </a:ln>
-            </p:spPr>
-            <p:txBody>
-              <a:bodyPr wrap="square" rtlCol="0">
-                <a:spAutoFit/>
-              </a:bodyPr>
-              <a:lstStyle/>
-              <a:p>
-                <a:pPr algn="ctr"/>
-                <a:r>
-                  <a:rPr lang="en-US" sz="700" dirty="0" smtClean="0"/>
-                  <a:t>CSV Validator</a:t>
-                </a:r>
-                <a:endParaRPr lang="en-US" sz="700" dirty="0"/>
-              </a:p>
-            </p:txBody>
-          </p:sp>
-          <p:sp>
-            <p:nvSpPr>
-              <p:cNvPr id="64" name="TextBox 63"/>
-              <p:cNvSpPr txBox="1"/>
-              <p:nvPr/>
-            </p:nvSpPr>
-            <p:spPr>
-              <a:xfrm>
-                <a:off x="3950541" y="3522407"/>
-                <a:ext cx="930887" cy="200055"/>
-              </a:xfrm>
-              <a:prstGeom prst="rect">
-                <a:avLst/>
-              </a:prstGeom>
-              <a:solidFill>
-                <a:srgbClr val="FFC000">
-                  <a:alpha val="21961"/>
-                </a:srgbClr>
-              </a:solidFill>
-              <a:ln>
-                <a:solidFill>
-                  <a:schemeClr val="tx1"/>
-                </a:solidFill>
-              </a:ln>
-            </p:spPr>
-            <p:txBody>
-              <a:bodyPr wrap="square" rtlCol="0">
-                <a:spAutoFit/>
-              </a:bodyPr>
-              <a:lstStyle/>
-              <a:p>
-                <a:pPr algn="ctr"/>
-                <a:r>
-                  <a:rPr lang="en-US" sz="700" dirty="0" smtClean="0"/>
-                  <a:t>RDF Validator</a:t>
-                </a:r>
-                <a:endParaRPr lang="en-US" sz="700" dirty="0"/>
-              </a:p>
-            </p:txBody>
-          </p:sp>
-          <p:sp>
-            <p:nvSpPr>
-              <p:cNvPr id="65" name="TextBox 64"/>
-              <p:cNvSpPr txBox="1"/>
-              <p:nvPr/>
-            </p:nvSpPr>
-            <p:spPr>
-              <a:xfrm>
-                <a:off x="4184789" y="3551687"/>
-                <a:ext cx="344039" cy="369332"/>
-              </a:xfrm>
-              <a:prstGeom prst="rect">
-                <a:avLst/>
-              </a:prstGeom>
-              <a:noFill/>
-            </p:spPr>
-            <p:txBody>
-              <a:bodyPr wrap="none" rtlCol="0">
-                <a:spAutoFit/>
-              </a:bodyPr>
-              <a:lstStyle/>
-              <a:p>
-                <a:r>
-                  <a:rPr lang="en-US" dirty="0" smtClean="0"/>
-                  <a:t>…</a:t>
-                </a:r>
-                <a:endParaRPr lang="en-US" dirty="0"/>
-              </a:p>
-            </p:txBody>
-          </p:sp>
-        </p:grpSp>
-      </p:grpSp>
-      <p:grpSp>
-        <p:nvGrpSpPr>
-          <p:cNvPr id="6" name="Group 5"/>
-          <p:cNvGrpSpPr/>
-          <p:nvPr/>
-        </p:nvGrpSpPr>
-        <p:grpSpPr>
-          <a:xfrm>
-            <a:off x="1233443" y="1288150"/>
-            <a:ext cx="4664157" cy="284513"/>
-            <a:chOff x="1247066" y="1612920"/>
-            <a:chExt cx="4664157" cy="284513"/>
-          </a:xfrm>
-        </p:grpSpPr>
-        <p:sp>
-          <p:nvSpPr>
-            <p:cNvPr id="51" name="TextBox 50"/>
-            <p:cNvSpPr txBox="1"/>
-            <p:nvPr/>
-          </p:nvSpPr>
-          <p:spPr>
-            <a:xfrm>
-              <a:off x="5562600" y="1612920"/>
-              <a:ext cx="348623" cy="276999"/>
-            </a:xfrm>
-            <a:prstGeom prst="rect">
-              <a:avLst/>
-            </a:prstGeom>
-            <a:noFill/>
-          </p:spPr>
-          <p:txBody>
-            <a:bodyPr wrap="none" rtlCol="0">
-              <a:spAutoFit/>
-            </a:bodyPr>
-            <a:lstStyle/>
-            <a:p>
-              <a:r>
-                <a:rPr lang="en-US" sz="1200" dirty="0" smtClean="0"/>
-                <a:t>(ii)</a:t>
-              </a:r>
-              <a:endParaRPr lang="en-US" sz="1200" dirty="0"/>
-            </a:p>
-          </p:txBody>
-        </p:sp>
-        <p:sp>
-          <p:nvSpPr>
-            <p:cNvPr id="67" name="TextBox 66"/>
-            <p:cNvSpPr txBox="1"/>
-            <p:nvPr/>
-          </p:nvSpPr>
-          <p:spPr>
-            <a:xfrm>
-              <a:off x="1247066" y="1651212"/>
-              <a:ext cx="4290319" cy="246221"/>
+              <a:off x="-592226" y="5387181"/>
+              <a:ext cx="4290319" cy="103871"/>
             </a:xfrm>
             <a:prstGeom prst="rect">
               <a:avLst/>
@@ -3853,40 +4131,24 @@
               <a:schemeClr val="bg1"/>
             </a:solidFill>
             <a:ln>
-              <a:solidFill>
-                <a:schemeClr val="tx1"/>
-              </a:solidFill>
+              <a:noFill/>
             </a:ln>
           </p:spPr>
           <p:txBody>
-            <a:bodyPr wrap="square" rtlCol="0">
+            <a:bodyPr wrap="square" rtlCol="0" anchor="ctr">
               <a:spAutoFit/>
             </a:bodyPr>
             <a:lstStyle/>
             <a:p>
               <a:pPr algn="ctr"/>
               <a:r>
-                <a:rPr lang="en-US" sz="1000" dirty="0"/>
-                <a:t>Metadata Extractor</a:t>
+                <a:rPr lang="en-US" sz="1000" dirty="0" smtClean="0"/>
+                <a:t>Profile and Report Generator</a:t>
               </a:r>
+              <a:endParaRPr lang="en-US" sz="1000" dirty="0"/>
             </a:p>
           </p:txBody>
         </p:sp>
-      </p:grpSp>
-      <p:grpSp>
-        <p:nvGrpSpPr>
-          <p:cNvPr id="2" name="Group 1"/>
-          <p:cNvGrpSpPr/>
-          <p:nvPr/>
-        </p:nvGrpSpPr>
-        <p:grpSpPr>
-          <a:xfrm>
-            <a:off x="1247066" y="4797431"/>
-            <a:ext cx="4711478" cy="276999"/>
-            <a:chOff x="1247066" y="5287076"/>
-            <a:chExt cx="4711478" cy="276999"/>
-          </a:xfrm>
-        </p:grpSpPr>
         <p:sp>
           <p:nvSpPr>
             <p:cNvPr id="90" name="TextBox 89"/>
@@ -3895,8 +4157,8 @@
           </p:nvSpPr>
           <p:spPr>
             <a:xfrm>
-              <a:off x="5611048" y="5287076"/>
-              <a:ext cx="347496" cy="276999"/>
+              <a:off x="-624917" y="5300859"/>
+              <a:ext cx="347495" cy="276999"/>
             </a:xfrm>
             <a:prstGeom prst="rect">
               <a:avLst/>
@@ -3917,328 +4179,243 @@
             </a:p>
           </p:txBody>
         </p:sp>
-        <p:sp>
-          <p:nvSpPr>
-            <p:cNvPr id="92" name="TextBox 91"/>
-            <p:cNvSpPr txBox="1"/>
-            <p:nvPr/>
-          </p:nvSpPr>
-          <p:spPr>
-            <a:xfrm>
-              <a:off x="1247066" y="5310029"/>
-              <a:ext cx="4290319" cy="246221"/>
-            </a:xfrm>
-            <a:prstGeom prst="rect">
-              <a:avLst/>
-            </a:prstGeom>
+      </p:grpSp>
+      <p:sp>
+        <p:nvSpPr>
+          <p:cNvPr id="79" name="Rectangle 78"/>
+          <p:cNvSpPr/>
+          <p:nvPr/>
+        </p:nvSpPr>
+        <p:spPr>
+          <a:xfrm>
+            <a:off x="965729" y="1831605"/>
+            <a:ext cx="994454" cy="1521152"/>
+          </a:xfrm>
+          <a:prstGeom prst="rect">
+            <a:avLst/>
+          </a:prstGeom>
+          <a:noFill/>
+          <a:ln>
             <a:solidFill>
-              <a:schemeClr val="bg1"/>
+              <a:schemeClr val="tx1"/>
             </a:solidFill>
-            <a:ln>
-              <a:solidFill>
-                <a:schemeClr val="tx1"/>
-              </a:solidFill>
-            </a:ln>
-          </p:spPr>
-          <p:txBody>
-            <a:bodyPr wrap="square" rtlCol="0">
-              <a:spAutoFit/>
-            </a:bodyPr>
-            <a:lstStyle/>
-            <a:p>
-              <a:pPr algn="ctr"/>
-              <a:r>
-                <a:rPr lang="en-US" sz="1000" dirty="0" smtClean="0"/>
-                <a:t>Profile and Report Generator</a:t>
-              </a:r>
-              <a:endParaRPr lang="en-US" sz="1000" dirty="0"/>
-            </a:p>
-          </p:txBody>
-        </p:sp>
-      </p:grpSp>
+          </a:ln>
+          <a:effectLst/>
+        </p:spPr>
+        <p:style>
+          <a:lnRef idx="1">
+            <a:schemeClr val="accent1"/>
+          </a:lnRef>
+          <a:fillRef idx="3">
+            <a:schemeClr val="accent1"/>
+          </a:fillRef>
+          <a:effectRef idx="2">
+            <a:schemeClr val="accent1"/>
+          </a:effectRef>
+          <a:fontRef idx="minor">
+            <a:schemeClr val="lt1"/>
+          </a:fontRef>
+        </p:style>
+        <p:txBody>
+          <a:bodyPr rtlCol="0" anchor="ctr"/>
+          <a:lstStyle/>
+          <a:p>
+            <a:pPr algn="ctr"/>
+            <a:endParaRPr lang="en-US"/>
+          </a:p>
+        </p:txBody>
+      </p:sp>
+      <p:sp>
+        <p:nvSpPr>
+          <p:cNvPr id="43" name="Rectangle 42"/>
+          <p:cNvSpPr/>
+          <p:nvPr/>
+        </p:nvSpPr>
+        <p:spPr>
+          <a:xfrm>
+            <a:off x="2079563" y="1831604"/>
+            <a:ext cx="5766423" cy="1521153"/>
+          </a:xfrm>
+          <a:prstGeom prst="rect">
+            <a:avLst/>
+          </a:prstGeom>
+          <a:noFill/>
+          <a:ln>
+            <a:solidFill>
+              <a:schemeClr val="tx1"/>
+            </a:solidFill>
+          </a:ln>
+          <a:effectLst/>
+        </p:spPr>
+        <p:style>
+          <a:lnRef idx="1">
+            <a:schemeClr val="accent1"/>
+          </a:lnRef>
+          <a:fillRef idx="3">
+            <a:schemeClr val="accent1"/>
+          </a:fillRef>
+          <a:effectRef idx="2">
+            <a:schemeClr val="accent1"/>
+          </a:effectRef>
+          <a:fontRef idx="minor">
+            <a:schemeClr val="lt1"/>
+          </a:fontRef>
+        </p:style>
+        <p:txBody>
+          <a:bodyPr rtlCol="0" anchor="ctr"/>
+          <a:lstStyle/>
+          <a:p>
+            <a:pPr algn="ctr"/>
+            <a:endParaRPr lang="en-US"/>
+          </a:p>
+        </p:txBody>
+      </p:sp>
+      <p:sp>
+        <p:nvSpPr>
+          <p:cNvPr id="50" name="TextBox 49"/>
+          <p:cNvSpPr txBox="1"/>
+          <p:nvPr/>
+        </p:nvSpPr>
+        <p:spPr>
+          <a:xfrm>
+            <a:off x="2205738" y="1875384"/>
+            <a:ext cx="5560595" cy="246221"/>
+          </a:xfrm>
+          <a:prstGeom prst="rect">
+            <a:avLst/>
+          </a:prstGeom>
+          <a:solidFill>
+            <a:schemeClr val="bg1"/>
+          </a:solidFill>
+          <a:ln>
+            <a:noFill/>
+          </a:ln>
+        </p:spPr>
+        <p:txBody>
+          <a:bodyPr wrap="square" rtlCol="0" anchor="ctr">
+            <a:spAutoFit/>
+          </a:bodyPr>
+          <a:lstStyle/>
+          <a:p>
+            <a:pPr algn="ctr"/>
+            <a:r>
+              <a:rPr lang="en-US" sz="1000" dirty="0" smtClean="0"/>
+              <a:t>Profile Validator</a:t>
+            </a:r>
+            <a:endParaRPr lang="en-US" sz="1000" dirty="0"/>
+          </a:p>
+        </p:txBody>
+      </p:sp>
       <p:grpSp>
         <p:nvGrpSpPr>
-          <p:cNvPr id="3" name="Group 2"/>
+          <p:cNvPr id="9" name="Group 8"/>
           <p:cNvGrpSpPr/>
           <p:nvPr/>
         </p:nvGrpSpPr>
         <p:grpSpPr>
           <a:xfrm>
-            <a:off x="1244621" y="2892300"/>
-            <a:ext cx="4698623" cy="1835904"/>
-            <a:chOff x="1247066" y="3665905"/>
-            <a:chExt cx="4698623" cy="1531908"/>
+            <a:off x="4334647" y="2146383"/>
+            <a:ext cx="3485237" cy="994435"/>
+            <a:chOff x="4209815" y="2291752"/>
+            <a:chExt cx="3617720" cy="994435"/>
           </a:xfrm>
         </p:grpSpPr>
-        <p:sp>
-          <p:nvSpPr>
-            <p:cNvPr id="66" name="TextBox 65"/>
-            <p:cNvSpPr txBox="1"/>
-            <p:nvPr/>
-          </p:nvSpPr>
-          <p:spPr>
-            <a:xfrm>
-              <a:off x="1247066" y="3720485"/>
-              <a:ext cx="4290319" cy="1477328"/>
-            </a:xfrm>
-            <a:prstGeom prst="rect">
-              <a:avLst/>
-            </a:prstGeom>
-            <a:solidFill>
-              <a:schemeClr val="bg1"/>
-            </a:solidFill>
-            <a:ln>
-              <a:solidFill>
-                <a:schemeClr val="tx1"/>
-              </a:solidFill>
-            </a:ln>
-          </p:spPr>
-          <p:txBody>
-            <a:bodyPr wrap="square" rtlCol="0">
-              <a:spAutoFit/>
-            </a:bodyPr>
-            <a:lstStyle/>
-            <a:p>
-              <a:pPr algn="ctr"/>
-              <a:r>
-                <a:rPr lang="en-US" sz="1000" dirty="0" smtClean="0"/>
-                <a:t>Profile Validator</a:t>
-              </a:r>
-              <a:endParaRPr lang="en-US" sz="1000" dirty="0"/>
-            </a:p>
-            <a:p>
-              <a:pPr algn="ctr"/>
-              <a:endParaRPr lang="en-US" sz="1000" dirty="0" smtClean="0"/>
-            </a:p>
-            <a:p>
-              <a:pPr algn="ctr"/>
-              <a:endParaRPr lang="en-US" sz="1000" dirty="0"/>
-            </a:p>
-            <a:p>
-              <a:pPr algn="ctr"/>
-              <a:endParaRPr lang="en-US" sz="1000" dirty="0" smtClean="0"/>
-            </a:p>
-            <a:p>
-              <a:pPr algn="ctr"/>
-              <a:endParaRPr lang="en-US" sz="1000" dirty="0"/>
-            </a:p>
-            <a:p>
-              <a:pPr algn="ctr"/>
-              <a:endParaRPr lang="en-US" sz="1000" dirty="0" smtClean="0"/>
-            </a:p>
-            <a:p>
-              <a:pPr algn="ctr"/>
-              <a:endParaRPr lang="en-US" sz="1000" dirty="0"/>
-            </a:p>
-            <a:p>
-              <a:pPr algn="ctr"/>
-              <a:endParaRPr lang="en-US" sz="1000" dirty="0" smtClean="0"/>
-            </a:p>
-            <a:p>
-              <a:pPr algn="ctr"/>
-              <a:endParaRPr lang="en-US" sz="1000" dirty="0"/>
-            </a:p>
-          </p:txBody>
-        </p:sp>
-        <p:sp>
-          <p:nvSpPr>
-            <p:cNvPr id="14" name="TextBox 13"/>
-            <p:cNvSpPr txBox="1"/>
-            <p:nvPr/>
-          </p:nvSpPr>
-          <p:spPr>
-            <a:xfrm>
-              <a:off x="2902713" y="3977564"/>
-              <a:ext cx="1165025" cy="430887"/>
-            </a:xfrm>
-            <a:prstGeom prst="rect">
-              <a:avLst/>
-            </a:prstGeom>
-            <a:solidFill>
-              <a:schemeClr val="tx1"/>
-            </a:solidFill>
-            <a:ln>
-              <a:solidFill>
-                <a:schemeClr val="tx1"/>
-              </a:solidFill>
-            </a:ln>
-          </p:spPr>
-          <p:txBody>
-            <a:bodyPr wrap="square" rtlCol="0">
-              <a:spAutoFit/>
-            </a:bodyPr>
-            <a:lstStyle/>
-            <a:p>
-              <a:pPr algn="ctr"/>
-              <a:r>
-                <a:rPr lang="en-US" sz="1100" dirty="0" smtClean="0">
-                  <a:solidFill>
-                    <a:schemeClr val="bg1"/>
-                  </a:solidFill>
-                </a:rPr>
-                <a:t>Statistical Profiler</a:t>
-              </a:r>
-              <a:endParaRPr lang="en-US" sz="1100" dirty="0">
-                <a:solidFill>
-                  <a:schemeClr val="bg1"/>
-                </a:solidFill>
-              </a:endParaRPr>
-            </a:p>
-          </p:txBody>
-        </p:sp>
-        <p:sp>
-          <p:nvSpPr>
-            <p:cNvPr id="69" name="TextBox 68"/>
-            <p:cNvSpPr txBox="1"/>
-            <p:nvPr/>
-          </p:nvSpPr>
-          <p:spPr>
-            <a:xfrm>
-              <a:off x="5562877" y="3665905"/>
-              <a:ext cx="382812" cy="276999"/>
-            </a:xfrm>
-            <a:prstGeom prst="rect">
-              <a:avLst/>
-            </a:prstGeom>
-            <a:noFill/>
-          </p:spPr>
-          <p:txBody>
-            <a:bodyPr wrap="none" rtlCol="0">
-              <a:spAutoFit/>
-            </a:bodyPr>
-            <a:lstStyle/>
-            <a:p>
-              <a:r>
-                <a:rPr lang="en-US" sz="1200" dirty="0" smtClean="0"/>
-                <a:t>(iv)</a:t>
-              </a:r>
-              <a:endParaRPr lang="en-US" sz="1200" dirty="0"/>
-            </a:p>
-          </p:txBody>
-        </p:sp>
         <p:grpSp>
           <p:nvGrpSpPr>
-            <p:cNvPr id="88" name="Group 87"/>
+            <p:cNvPr id="7" name="Group 6"/>
             <p:cNvGrpSpPr/>
             <p:nvPr/>
           </p:nvGrpSpPr>
           <p:grpSpPr>
             <a:xfrm>
-              <a:off x="1343826" y="3966411"/>
-              <a:ext cx="1440366" cy="1153747"/>
-              <a:chOff x="2007940" y="4434046"/>
-              <a:chExt cx="1440366" cy="1153747"/>
+              <a:off x="4228266" y="2291752"/>
+              <a:ext cx="3538068" cy="994435"/>
+              <a:chOff x="4228266" y="2024553"/>
+              <a:chExt cx="3538068" cy="994435"/>
             </a:xfrm>
           </p:grpSpPr>
-          <p:grpSp>
-            <p:nvGrpSpPr>
-              <p:cNvPr id="18" name="Group 17"/>
-              <p:cNvGrpSpPr/>
+          <p:sp>
+            <p:nvSpPr>
+              <p:cNvPr id="69" name="TextBox 68"/>
+              <p:cNvSpPr txBox="1"/>
               <p:nvPr/>
-            </p:nvGrpSpPr>
-            <p:grpSpPr>
+            </p:nvSpPr>
+            <p:spPr>
               <a:xfrm>
-                <a:off x="2007940" y="4434046"/>
-                <a:ext cx="1440366" cy="1153747"/>
-                <a:chOff x="3124200" y="1905279"/>
-                <a:chExt cx="1440366" cy="814887"/>
+                <a:off x="4228266" y="2051449"/>
+                <a:ext cx="590812" cy="331967"/>
               </a:xfrm>
-            </p:grpSpPr>
-            <p:sp>
-              <p:nvSpPr>
-                <p:cNvPr id="21" name="Rectangle 20"/>
-                <p:cNvSpPr/>
-                <p:nvPr/>
-              </p:nvSpPr>
-              <p:spPr>
-                <a:xfrm>
-                  <a:off x="3124200" y="1905279"/>
-                  <a:ext cx="1440366" cy="814887"/>
-                </a:xfrm>
-                <a:prstGeom prst="rect">
-                  <a:avLst/>
-                </a:prstGeom>
+              <a:prstGeom prst="rect">
+                <a:avLst/>
+              </a:prstGeom>
+              <a:noFill/>
+            </p:spPr>
+            <p:txBody>
+              <a:bodyPr wrap="none" rtlCol="0">
+                <a:spAutoFit/>
+              </a:bodyPr>
+              <a:lstStyle/>
+              <a:p>
+                <a:r>
+                  <a:rPr lang="en-US" sz="1200" dirty="0" smtClean="0"/>
+                  <a:t>(iv)</a:t>
+                </a:r>
+                <a:endParaRPr lang="en-US" sz="1200" dirty="0"/>
+              </a:p>
+            </p:txBody>
+          </p:sp>
+          <p:sp>
+            <p:nvSpPr>
+              <p:cNvPr id="21" name="Rectangle 20"/>
+              <p:cNvSpPr/>
+              <p:nvPr/>
+            </p:nvSpPr>
+            <p:spPr>
+              <a:xfrm>
+                <a:off x="4228266" y="2024553"/>
+                <a:ext cx="3538068" cy="994435"/>
+              </a:xfrm>
+              <a:prstGeom prst="rect">
+                <a:avLst/>
+              </a:prstGeom>
+              <a:solidFill>
+                <a:schemeClr val="tx1"/>
+              </a:solidFill>
+              <a:ln w="9525">
                 <a:solidFill>
-                  <a:srgbClr val="000000"/>
+                  <a:schemeClr val="tx1"/>
                 </a:solidFill>
-                <a:ln w="9525">
+              </a:ln>
+            </p:spPr>
+            <p:style>
+              <a:lnRef idx="2">
+                <a:schemeClr val="accent1">
+                  <a:shade val="50000"/>
+                </a:schemeClr>
+              </a:lnRef>
+              <a:fillRef idx="1">
+                <a:schemeClr val="accent1"/>
+              </a:fillRef>
+              <a:effectRef idx="0">
+                <a:schemeClr val="accent1"/>
+              </a:effectRef>
+              <a:fontRef idx="minor">
+                <a:schemeClr val="lt1"/>
+              </a:fontRef>
+            </p:style>
+            <p:txBody>
+              <a:bodyPr rtlCol="0" anchor="ctr"/>
+              <a:lstStyle/>
+              <a:p>
+                <a:pPr algn="ctr"/>
+                <a:endParaRPr lang="en-US" dirty="0">
                   <a:solidFill>
-                    <a:schemeClr val="tx1"/>
+                    <a:srgbClr val="FFFFFF"/>
                   </a:solidFill>
-                </a:ln>
-              </p:spPr>
-              <p:style>
-                <a:lnRef idx="2">
-                  <a:schemeClr val="accent1">
-                    <a:shade val="50000"/>
-                  </a:schemeClr>
-                </a:lnRef>
-                <a:fillRef idx="1">
-                  <a:schemeClr val="accent1"/>
-                </a:fillRef>
-                <a:effectRef idx="0">
-                  <a:schemeClr val="accent1"/>
-                </a:effectRef>
-                <a:fontRef idx="minor">
-                  <a:schemeClr val="lt1"/>
-                </a:fontRef>
-              </p:style>
-              <p:txBody>
-                <a:bodyPr rtlCol="0" anchor="ctr"/>
-                <a:lstStyle/>
-                <a:p>
-                  <a:pPr algn="ctr"/>
-                  <a:endParaRPr lang="en-US" dirty="0">
-                    <a:solidFill>
-                      <a:schemeClr val="bg1"/>
-                    </a:solidFill>
-                  </a:endParaRPr>
-                </a:p>
-              </p:txBody>
-            </p:sp>
-            <p:sp>
-              <p:nvSpPr>
-                <p:cNvPr id="22" name="TextBox 21"/>
-                <p:cNvSpPr txBox="1"/>
-                <p:nvPr/>
-              </p:nvSpPr>
-              <p:spPr>
-                <a:xfrm>
-                  <a:off x="3124200" y="1915582"/>
-                  <a:ext cx="1440366" cy="179340"/>
-                </a:xfrm>
-                <a:prstGeom prst="rect">
-                  <a:avLst/>
-                </a:prstGeom>
-                <a:noFill/>
-                <a:ln>
-                  <a:noFill/>
-                </a:ln>
-              </p:spPr>
-              <p:txBody>
-                <a:bodyPr wrap="square" rtlCol="0">
-                  <a:spAutoFit/>
-                </a:bodyPr>
-                <a:lstStyle/>
-                <a:p>
-                  <a:pPr algn="ctr"/>
-                  <a:r>
-                    <a:rPr lang="en-US" sz="1050" dirty="0" smtClean="0">
-                      <a:solidFill>
-                        <a:schemeClr val="bg1"/>
-                      </a:solidFill>
-                    </a:rPr>
-                    <a:t>Metadata Profiler</a:t>
-                  </a:r>
-                  <a:endParaRPr lang="en-US" sz="1050" dirty="0">
-                    <a:solidFill>
-                      <a:schemeClr val="bg1"/>
-                    </a:solidFill>
-                  </a:endParaRPr>
-                </a:p>
-              </p:txBody>
-            </p:sp>
-          </p:grpSp>
+                </a:endParaRPr>
+              </a:p>
+            </p:txBody>
+          </p:sp>
           <p:sp>
             <p:nvSpPr>
               <p:cNvPr id="15" name="TextBox 14"/>
@@ -4247,16 +4424,152 @@
             </p:nvSpPr>
             <p:spPr>
               <a:xfrm>
-                <a:off x="2211855" y="4650226"/>
-                <a:ext cx="1082599" cy="215444"/>
+                <a:off x="4337511" y="2372802"/>
+                <a:ext cx="683953" cy="338554"/>
               </a:xfrm>
               <a:prstGeom prst="rect">
                 <a:avLst/>
               </a:prstGeom>
               <a:solidFill>
-                <a:schemeClr val="bg1">
-                  <a:lumMod val="65000"/>
-                </a:schemeClr>
+                <a:srgbClr val="FFF1C6"/>
+              </a:solidFill>
+              <a:ln>
+                <a:solidFill>
+                  <a:schemeClr val="tx1"/>
+                </a:solidFill>
+              </a:ln>
+            </p:spPr>
+            <p:txBody>
+              <a:bodyPr wrap="square" rtlCol="0">
+                <a:spAutoFit/>
+              </a:bodyPr>
+              <a:lstStyle/>
+              <a:p>
+                <a:pPr algn="ctr"/>
+                <a:r>
+                  <a:rPr lang="en-US" sz="800" dirty="0" smtClean="0">
+                    <a:solidFill>
+                      <a:srgbClr val="000000"/>
+                    </a:solidFill>
+                  </a:rPr>
+                  <a:t>General Profiler</a:t>
+                </a:r>
+                <a:endParaRPr lang="en-US" sz="800" dirty="0">
+                  <a:solidFill>
+                    <a:srgbClr val="000000"/>
+                  </a:solidFill>
+                </a:endParaRPr>
+              </a:p>
+            </p:txBody>
+          </p:sp>
+          <p:sp>
+            <p:nvSpPr>
+              <p:cNvPr id="86" name="TextBox 85"/>
+              <p:cNvSpPr txBox="1"/>
+              <p:nvPr/>
+            </p:nvSpPr>
+            <p:spPr>
+              <a:xfrm>
+                <a:off x="5198091" y="2383416"/>
+                <a:ext cx="683953" cy="338554"/>
+              </a:xfrm>
+              <a:prstGeom prst="rect">
+                <a:avLst/>
+              </a:prstGeom>
+              <a:solidFill>
+                <a:srgbClr val="FFF1C6"/>
+              </a:solidFill>
+              <a:ln>
+                <a:solidFill>
+                  <a:schemeClr val="tx1"/>
+                </a:solidFill>
+              </a:ln>
+            </p:spPr>
+            <p:txBody>
+              <a:bodyPr wrap="square" rtlCol="0">
+                <a:spAutoFit/>
+              </a:bodyPr>
+              <a:lstStyle/>
+              <a:p>
+                <a:pPr algn="ctr"/>
+                <a:r>
+                  <a:rPr lang="en-US" sz="800" dirty="0" smtClean="0">
+                    <a:solidFill>
+                      <a:srgbClr val="000000"/>
+                    </a:solidFill>
+                  </a:rPr>
+                  <a:t>Ownership Profiler</a:t>
+                </a:r>
+                <a:endParaRPr lang="en-US" sz="800" dirty="0">
+                  <a:solidFill>
+                    <a:srgbClr val="000000"/>
+                  </a:solidFill>
+                </a:endParaRPr>
+              </a:p>
+            </p:txBody>
+          </p:sp>
+          <p:sp>
+            <p:nvSpPr>
+              <p:cNvPr id="87" name="TextBox 86"/>
+              <p:cNvSpPr txBox="1"/>
+              <p:nvPr/>
+            </p:nvSpPr>
+            <p:spPr>
+              <a:xfrm>
+                <a:off x="6093507" y="2391067"/>
+                <a:ext cx="683953" cy="338554"/>
+              </a:xfrm>
+              <a:prstGeom prst="rect">
+                <a:avLst/>
+              </a:prstGeom>
+              <a:solidFill>
+                <a:srgbClr val="FFF1C6"/>
+              </a:solidFill>
+              <a:ln>
+                <a:solidFill>
+                  <a:schemeClr val="tx1"/>
+                </a:solidFill>
+              </a:ln>
+            </p:spPr>
+            <p:txBody>
+              <a:bodyPr wrap="square" rtlCol="0">
+                <a:spAutoFit/>
+              </a:bodyPr>
+              <a:lstStyle/>
+              <a:p>
+                <a:pPr algn="ctr"/>
+                <a:r>
+                  <a:rPr lang="en-US" sz="800" dirty="0" smtClean="0">
+                    <a:solidFill>
+                      <a:srgbClr val="000000"/>
+                    </a:solidFill>
+                  </a:rPr>
+                  <a:t>Access Profiler</a:t>
+                </a:r>
+                <a:endParaRPr lang="en-US" sz="800" dirty="0">
+                  <a:solidFill>
+                    <a:srgbClr val="000000"/>
+                  </a:solidFill>
+                </a:endParaRPr>
+              </a:p>
+            </p:txBody>
+          </p:sp>
+          <p:sp>
+            <p:nvSpPr>
+              <p:cNvPr id="42" name="TextBox 41"/>
+              <p:cNvSpPr txBox="1"/>
+              <p:nvPr/>
+            </p:nvSpPr>
+            <p:spPr>
+              <a:xfrm>
+                <a:off x="6975281" y="2387565"/>
+                <a:ext cx="683953" cy="342056"/>
+              </a:xfrm>
+              <a:prstGeom prst="rect">
+                <a:avLst/>
+              </a:prstGeom>
+              <a:solidFill>
+                <a:srgbClr val="FFF1C6"/>
               </a:solidFill>
               <a:ln>
                 <a:solidFill>
@@ -4273,87 +4586,7 @@
                 <a:pPr algn="ctr"/>
                 <a:r>
                   <a:rPr lang="en-US" sz="800" dirty="0" smtClean="0"/>
-                  <a:t>General Profiler</a:t>
-                </a:r>
-                <a:endParaRPr lang="en-US" sz="800" dirty="0"/>
-              </a:p>
-            </p:txBody>
-          </p:sp>
-          <p:sp>
-            <p:nvSpPr>
-              <p:cNvPr id="86" name="TextBox 85"/>
-              <p:cNvSpPr txBox="1"/>
-              <p:nvPr/>
-            </p:nvSpPr>
-            <p:spPr>
-              <a:xfrm>
-                <a:off x="2210483" y="4883500"/>
-                <a:ext cx="1082599" cy="215444"/>
-              </a:xfrm>
-              <a:prstGeom prst="rect">
-                <a:avLst/>
-              </a:prstGeom>
-              <a:solidFill>
-                <a:schemeClr val="bg1">
-                  <a:lumMod val="65000"/>
-                </a:schemeClr>
-              </a:solidFill>
-              <a:ln>
-                <a:solidFill>
-                  <a:schemeClr val="tx1"/>
-                </a:solidFill>
-              </a:ln>
-            </p:spPr>
-            <p:txBody>
-              <a:bodyPr wrap="square" rtlCol="0">
-                <a:spAutoFit/>
-              </a:bodyPr>
-              <a:lstStyle/>
-              <a:p>
-                <a:pPr algn="ctr"/>
-                <a:r>
-                  <a:rPr lang="en-US" sz="800" dirty="0" smtClean="0"/>
-                  <a:t>Ownership Profiler</a:t>
-                </a:r>
-                <a:endParaRPr lang="en-US" sz="800" dirty="0"/>
-              </a:p>
-            </p:txBody>
-          </p:sp>
-          <p:sp>
-            <p:nvSpPr>
-              <p:cNvPr id="87" name="TextBox 86"/>
-              <p:cNvSpPr txBox="1"/>
-              <p:nvPr/>
-            </p:nvSpPr>
-            <p:spPr>
-              <a:xfrm>
-                <a:off x="2213298" y="5126277"/>
-                <a:ext cx="1082599" cy="179770"/>
-              </a:xfrm>
-              <a:prstGeom prst="rect">
-                <a:avLst/>
-              </a:prstGeom>
-              <a:solidFill>
-                <a:schemeClr val="bg1">
-                  <a:lumMod val="65000"/>
-                </a:schemeClr>
-              </a:solidFill>
-              <a:ln>
-                <a:solidFill>
-                  <a:schemeClr val="tx1"/>
-                </a:solidFill>
-              </a:ln>
-            </p:spPr>
-            <p:txBody>
-              <a:bodyPr wrap="square" rtlCol="0">
-                <a:spAutoFit/>
-              </a:bodyPr>
-              <a:lstStyle/>
-              <a:p>
-                <a:pPr algn="ctr"/>
-                <a:r>
-                  <a:rPr lang="en-US" sz="800" dirty="0" smtClean="0"/>
-                  <a:t>Access Profiler</a:t>
+                  <a:t>Provenance Profiler</a:t>
                 </a:r>
                 <a:endParaRPr lang="en-US" sz="800" dirty="0"/>
               </a:p>
@@ -4362,25 +4595,127 @@
         </p:grpSp>
         <p:sp>
           <p:nvSpPr>
-            <p:cNvPr id="89" name="TextBox 88"/>
+            <p:cNvPr id="22" name="TextBox 21"/>
             <p:cNvSpPr txBox="1"/>
             <p:nvPr/>
           </p:nvSpPr>
           <p:spPr>
             <a:xfrm>
-              <a:off x="4238593" y="3982008"/>
-              <a:ext cx="1004295" cy="430887"/>
+              <a:off x="4209815" y="2291752"/>
+              <a:ext cx="3617720" cy="253916"/>
+            </a:xfrm>
+            <a:prstGeom prst="rect">
+              <a:avLst/>
+            </a:prstGeom>
+            <a:noFill/>
+            <a:ln>
+              <a:noFill/>
+            </a:ln>
+          </p:spPr>
+          <p:txBody>
+            <a:bodyPr wrap="square" rtlCol="0">
+              <a:spAutoFit/>
+            </a:bodyPr>
+            <a:lstStyle/>
+            <a:p>
+              <a:pPr algn="ctr"/>
+              <a:r>
+                <a:rPr lang="en-US" sz="1050" dirty="0" smtClean="0">
+                  <a:solidFill>
+                    <a:srgbClr val="FFFFFF"/>
+                  </a:solidFill>
+                </a:rPr>
+                <a:t>Metadata Profiler</a:t>
+              </a:r>
+              <a:endParaRPr lang="en-US" sz="1050" dirty="0">
+                <a:solidFill>
+                  <a:srgbClr val="FFFFFF"/>
+                </a:solidFill>
+              </a:endParaRPr>
+            </a:p>
+          </p:txBody>
+        </p:sp>
+      </p:grpSp>
+      <p:grpSp>
+        <p:nvGrpSpPr>
+          <p:cNvPr id="72" name="Group 71"/>
+          <p:cNvGrpSpPr/>
+          <p:nvPr/>
+        </p:nvGrpSpPr>
+        <p:grpSpPr>
+          <a:xfrm>
+            <a:off x="2175138" y="2124227"/>
+            <a:ext cx="994454" cy="994435"/>
+            <a:chOff x="3296908" y="2140372"/>
+            <a:chExt cx="994454" cy="994435"/>
+          </a:xfrm>
+        </p:grpSpPr>
+        <p:sp>
+          <p:nvSpPr>
+            <p:cNvPr id="73" name="Rectangle 72"/>
+            <p:cNvSpPr/>
+            <p:nvPr/>
+          </p:nvSpPr>
+          <p:spPr>
+            <a:xfrm>
+              <a:off x="3296908" y="2140372"/>
+              <a:ext cx="994454" cy="994435"/>
             </a:xfrm>
             <a:prstGeom prst="rect">
               <a:avLst/>
             </a:prstGeom>
             <a:solidFill>
-              <a:schemeClr val="tx1"/>
+              <a:schemeClr val="bg1">
+                <a:lumMod val="50000"/>
+              </a:schemeClr>
             </a:solidFill>
             <a:ln>
               <a:solidFill>
                 <a:schemeClr val="tx1"/>
               </a:solidFill>
+            </a:ln>
+            <a:effectLst/>
+          </p:spPr>
+          <p:style>
+            <a:lnRef idx="1">
+              <a:schemeClr val="accent1"/>
+            </a:lnRef>
+            <a:fillRef idx="3">
+              <a:schemeClr val="accent1"/>
+            </a:fillRef>
+            <a:effectRef idx="2">
+              <a:schemeClr val="accent1"/>
+            </a:effectRef>
+            <a:fontRef idx="minor">
+              <a:schemeClr val="lt1"/>
+            </a:fontRef>
+          </p:style>
+          <p:txBody>
+            <a:bodyPr rtlCol="0" anchor="ctr"/>
+            <a:lstStyle/>
+            <a:p>
+              <a:pPr algn="ctr"/>
+              <a:endParaRPr lang="en-US"/>
+            </a:p>
+          </p:txBody>
+        </p:sp>
+        <p:sp>
+          <p:nvSpPr>
+            <p:cNvPr id="74" name="TextBox 73"/>
+            <p:cNvSpPr txBox="1"/>
+            <p:nvPr/>
+          </p:nvSpPr>
+          <p:spPr>
+            <a:xfrm>
+              <a:off x="3329689" y="2359556"/>
+              <a:ext cx="898576" cy="430887"/>
+            </a:xfrm>
+            <a:prstGeom prst="rect">
+              <a:avLst/>
+            </a:prstGeom>
+            <a:noFill/>
+            <a:ln>
+              <a:noFill/>
             </a:ln>
           </p:spPr>
           <p:txBody>
@@ -4406,74 +4741,34 @@
             </a:p>
           </p:txBody>
         </p:sp>
-        <p:sp>
-          <p:nvSpPr>
-            <p:cNvPr id="45" name="TextBox 44"/>
-            <p:cNvSpPr txBox="1"/>
-            <p:nvPr/>
-          </p:nvSpPr>
-          <p:spPr>
-            <a:xfrm>
-              <a:off x="3950541" y="4536020"/>
-              <a:ext cx="344039" cy="369332"/>
-            </a:xfrm>
-            <a:prstGeom prst="rect">
-              <a:avLst/>
-            </a:prstGeom>
-            <a:noFill/>
-          </p:spPr>
-          <p:txBody>
-            <a:bodyPr wrap="none" rtlCol="0">
-              <a:spAutoFit/>
-            </a:bodyPr>
-            <a:lstStyle/>
-            <a:p>
-              <a:r>
-                <a:rPr lang="en-US" dirty="0" smtClean="0"/>
-                <a:t>…</a:t>
-              </a:r>
-              <a:endParaRPr lang="en-US" dirty="0"/>
-            </a:p>
-          </p:txBody>
-        </p:sp>
       </p:grpSp>
       <p:sp>
         <p:nvSpPr>
-          <p:cNvPr id="42" name="TextBox 41"/>
+          <p:cNvPr id="75" name="TextBox 74"/>
           <p:cNvSpPr txBox="1"/>
           <p:nvPr/>
         </p:nvSpPr>
         <p:spPr>
           <a:xfrm>
-            <a:off x="1551574" y="4356503"/>
-            <a:ext cx="1082599" cy="215444"/>
+            <a:off x="2041313" y="1816302"/>
+            <a:ext cx="382812" cy="276999"/>
           </a:xfrm>
           <a:prstGeom prst="rect">
             <a:avLst/>
           </a:prstGeom>
-          <a:solidFill>
-            <a:schemeClr val="bg1">
-              <a:lumMod val="65000"/>
-            </a:schemeClr>
-          </a:solidFill>
-          <a:ln>
-            <a:solidFill>
-              <a:schemeClr val="tx1"/>
-            </a:solidFill>
-          </a:ln>
+          <a:noFill/>
         </p:spPr>
         <p:txBody>
-          <a:bodyPr wrap="square" rtlCol="0">
+          <a:bodyPr wrap="none" rtlCol="0">
             <a:spAutoFit/>
           </a:bodyPr>
           <a:lstStyle/>
           <a:p>
-            <a:pPr algn="ctr"/>
-            <a:r>
-              <a:rPr lang="en-US" sz="800" dirty="0" smtClean="0"/>
-              <a:t>Provenance Profiler</a:t>
-            </a:r>
-            <a:endParaRPr lang="en-US" sz="800" dirty="0"/>
+            <a:r>
+              <a:rPr lang="en-US" sz="1200" dirty="0" smtClean="0"/>
+              <a:t>(iv)</a:t>
+            </a:r>
+            <a:endParaRPr lang="en-US" sz="1200" dirty="0"/>
           </a:p>
         </p:txBody>
       </p:sp>

</xml_diff>